<commit_message>
add CP_n_dim_hypercube_no_tree for cp8m
</commit_message>
<xml_diff>
--- a/spring12/slidesS12/simple-k-connect.pptx
+++ b/spring12/slidesS12/simple-k-connect.pptx
@@ -5,10 +5,10 @@
     <p:sldMasterId id="2147483650" r:id="rId1"/>
   </p:sldMasterIdLst>
   <p:notesMasterIdLst>
-    <p:notesMasterId r:id="rId18"/>
+    <p:notesMasterId r:id="rId21"/>
   </p:notesMasterIdLst>
   <p:handoutMasterIdLst>
-    <p:handoutMasterId r:id="rId19"/>
+    <p:handoutMasterId r:id="rId22"/>
   </p:handoutMasterIdLst>
   <p:sldIdLst>
     <p:sldId id="990" r:id="rId2"/>
@@ -22,16 +22,19 @@
     <p:sldId id="965" r:id="rId10"/>
     <p:sldId id="984" r:id="rId11"/>
     <p:sldId id="970" r:id="rId12"/>
-    <p:sldId id="996" r:id="rId13"/>
-    <p:sldId id="997" r:id="rId14"/>
-    <p:sldId id="995" r:id="rId15"/>
-    <p:sldId id="991" r:id="rId16"/>
-    <p:sldId id="980" r:id="rId17"/>
+    <p:sldId id="1000" r:id="rId13"/>
+    <p:sldId id="996" r:id="rId14"/>
+    <p:sldId id="997" r:id="rId15"/>
+    <p:sldId id="995" r:id="rId16"/>
+    <p:sldId id="998" r:id="rId17"/>
+    <p:sldId id="999" r:id="rId18"/>
+    <p:sldId id="991" r:id="rId19"/>
+    <p:sldId id="980" r:id="rId20"/>
   </p:sldIdLst>
   <p:sldSz cx="9144000" cy="6858000" type="screen4x3"/>
   <p:notesSz cx="9601200" cy="7315200"/>
   <p:custDataLst>
-    <p:tags r:id="rId21"/>
+    <p:tags r:id="rId24"/>
   </p:custDataLst>
   <p:defaultTextStyle>
     <a:defPPr>
@@ -1336,7 +1339,7 @@
       </p:grpSpPr>
       <p:sp>
         <p:nvSpPr>
-          <p:cNvPr id="35842" name="Rectangle 7"/>
+          <p:cNvPr id="28674" name="Rectangle 7"/>
           <p:cNvSpPr>
             <a:spLocks noGrp="1" noChangeArrowheads="1"/>
           </p:cNvSpPr>
@@ -1351,12 +1354,306 @@
           <a:bodyPr/>
           <a:lstStyle/>
           <a:p>
+            <a:fld id="{85F5844E-D5E4-47F6-A744-2E5515C4691E}" type="slidenum">
+              <a:rPr lang="en-US" smtClean="0">
+                <a:latin typeface="Times New Roman" pitchFamily="8" charset="0"/>
+              </a:rPr>
+              <a:pPr/>
+              <a:t>15</a:t>
+            </a:fld>
+            <a:endParaRPr lang="en-US" smtClean="0">
+              <a:latin typeface="Times New Roman" pitchFamily="8" charset="0"/>
+            </a:endParaRPr>
+          </a:p>
+        </p:txBody>
+      </p:sp>
+      <p:sp>
+        <p:nvSpPr>
+          <p:cNvPr id="28675" name="Rectangle 2"/>
+          <p:cNvSpPr>
+            <a:spLocks noGrp="1" noRot="1" noChangeAspect="1" noChangeArrowheads="1" noTextEdit="1"/>
+          </p:cNvSpPr>
+          <p:nvPr>
+            <p:ph type="sldImg"/>
+          </p:nvPr>
+        </p:nvSpPr>
+        <p:spPr>
+          <a:xfrm>
+            <a:off x="2974975" y="549275"/>
+            <a:ext cx="3657600" cy="2743200"/>
+          </a:xfrm>
+          <a:ln/>
+        </p:spPr>
+      </p:sp>
+      <p:sp>
+        <p:nvSpPr>
+          <p:cNvPr id="28676" name="Rectangle 3"/>
+          <p:cNvSpPr>
+            <a:spLocks noGrp="1" noChangeArrowheads="1"/>
+          </p:cNvSpPr>
+          <p:nvPr>
+            <p:ph type="body" idx="1"/>
+          </p:nvPr>
+        </p:nvSpPr>
+        <p:spPr>
+          <a:noFill/>
+          <a:ln/>
+        </p:spPr>
+        <p:txBody>
+          <a:bodyPr/>
+          <a:lstStyle/>
+          <a:p>
+            <a:pPr eaLnBrk="1" hangingPunct="1"/>
+            <a:endParaRPr lang="en-US" smtClean="0">
+              <a:latin typeface="Times New Roman" pitchFamily="8" charset="0"/>
+            </a:endParaRPr>
+          </a:p>
+        </p:txBody>
+      </p:sp>
+    </p:spTree>
+  </p:cSld>
+  <p:clrMapOvr>
+    <a:masterClrMapping/>
+  </p:clrMapOvr>
+</p:notes>
+</file>
+
+<file path=ppt/notesSlides/notesSlide15.xml><?xml version="1.0" encoding="utf-8"?>
+<p:notes xmlns:a="http://schemas.openxmlformats.org/drawingml/2006/main" xmlns:r="http://schemas.openxmlformats.org/officeDocument/2006/relationships" xmlns:p="http://schemas.openxmlformats.org/presentationml/2006/main">
+  <p:cSld>
+    <p:spTree>
+      <p:nvGrpSpPr>
+        <p:cNvPr id="1" name=""/>
+        <p:cNvGrpSpPr/>
+        <p:nvPr/>
+      </p:nvGrpSpPr>
+      <p:grpSpPr>
+        <a:xfrm>
+          <a:off x="0" y="0"/>
+          <a:ext cx="0" cy="0"/>
+          <a:chOff x="0" y="0"/>
+          <a:chExt cx="0" cy="0"/>
+        </a:xfrm>
+      </p:grpSpPr>
+      <p:sp>
+        <p:nvSpPr>
+          <p:cNvPr id="28674" name="Rectangle 7"/>
+          <p:cNvSpPr>
+            <a:spLocks noGrp="1" noChangeArrowheads="1"/>
+          </p:cNvSpPr>
+          <p:nvPr>
+            <p:ph type="sldNum" sz="quarter" idx="5"/>
+          </p:nvPr>
+        </p:nvSpPr>
+        <p:spPr>
+          <a:noFill/>
+        </p:spPr>
+        <p:txBody>
+          <a:bodyPr/>
+          <a:lstStyle/>
+          <a:p>
+            <a:fld id="{85F5844E-D5E4-47F6-A744-2E5515C4691E}" type="slidenum">
+              <a:rPr lang="en-US" smtClean="0">
+                <a:latin typeface="Times New Roman" pitchFamily="8" charset="0"/>
+              </a:rPr>
+              <a:pPr/>
+              <a:t>16</a:t>
+            </a:fld>
+            <a:endParaRPr lang="en-US" smtClean="0">
+              <a:latin typeface="Times New Roman" pitchFamily="8" charset="0"/>
+            </a:endParaRPr>
+          </a:p>
+        </p:txBody>
+      </p:sp>
+      <p:sp>
+        <p:nvSpPr>
+          <p:cNvPr id="28675" name="Rectangle 2"/>
+          <p:cNvSpPr>
+            <a:spLocks noGrp="1" noRot="1" noChangeAspect="1" noChangeArrowheads="1" noTextEdit="1"/>
+          </p:cNvSpPr>
+          <p:nvPr>
+            <p:ph type="sldImg"/>
+          </p:nvPr>
+        </p:nvSpPr>
+        <p:spPr>
+          <a:xfrm>
+            <a:off x="2974975" y="549275"/>
+            <a:ext cx="3657600" cy="2743200"/>
+          </a:xfrm>
+          <a:ln/>
+        </p:spPr>
+      </p:sp>
+      <p:sp>
+        <p:nvSpPr>
+          <p:cNvPr id="28676" name="Rectangle 3"/>
+          <p:cNvSpPr>
+            <a:spLocks noGrp="1" noChangeArrowheads="1"/>
+          </p:cNvSpPr>
+          <p:nvPr>
+            <p:ph type="body" idx="1"/>
+          </p:nvPr>
+        </p:nvSpPr>
+        <p:spPr>
+          <a:noFill/>
+          <a:ln/>
+        </p:spPr>
+        <p:txBody>
+          <a:bodyPr/>
+          <a:lstStyle/>
+          <a:p>
+            <a:pPr eaLnBrk="1" hangingPunct="1"/>
+            <a:endParaRPr lang="en-US" smtClean="0">
+              <a:latin typeface="Times New Roman" pitchFamily="8" charset="0"/>
+            </a:endParaRPr>
+          </a:p>
+        </p:txBody>
+      </p:sp>
+    </p:spTree>
+  </p:cSld>
+  <p:clrMapOvr>
+    <a:masterClrMapping/>
+  </p:clrMapOvr>
+</p:notes>
+</file>
+
+<file path=ppt/notesSlides/notesSlide16.xml><?xml version="1.0" encoding="utf-8"?>
+<p:notes xmlns:a="http://schemas.openxmlformats.org/drawingml/2006/main" xmlns:r="http://schemas.openxmlformats.org/officeDocument/2006/relationships" xmlns:p="http://schemas.openxmlformats.org/presentationml/2006/main">
+  <p:cSld>
+    <p:spTree>
+      <p:nvGrpSpPr>
+        <p:cNvPr id="1" name=""/>
+        <p:cNvGrpSpPr/>
+        <p:nvPr/>
+      </p:nvGrpSpPr>
+      <p:grpSpPr>
+        <a:xfrm>
+          <a:off x="0" y="0"/>
+          <a:ext cx="0" cy="0"/>
+          <a:chOff x="0" y="0"/>
+          <a:chExt cx="0" cy="0"/>
+        </a:xfrm>
+      </p:grpSpPr>
+      <p:sp>
+        <p:nvSpPr>
+          <p:cNvPr id="28674" name="Rectangle 7"/>
+          <p:cNvSpPr>
+            <a:spLocks noGrp="1" noChangeArrowheads="1"/>
+          </p:cNvSpPr>
+          <p:nvPr>
+            <p:ph type="sldNum" sz="quarter" idx="5"/>
+          </p:nvPr>
+        </p:nvSpPr>
+        <p:spPr>
+          <a:noFill/>
+        </p:spPr>
+        <p:txBody>
+          <a:bodyPr/>
+          <a:lstStyle/>
+          <a:p>
+            <a:fld id="{85F5844E-D5E4-47F6-A744-2E5515C4691E}" type="slidenum">
+              <a:rPr lang="en-US" smtClean="0">
+                <a:latin typeface="Times New Roman" pitchFamily="8" charset="0"/>
+              </a:rPr>
+              <a:pPr/>
+              <a:t>17</a:t>
+            </a:fld>
+            <a:endParaRPr lang="en-US" smtClean="0">
+              <a:latin typeface="Times New Roman" pitchFamily="8" charset="0"/>
+            </a:endParaRPr>
+          </a:p>
+        </p:txBody>
+      </p:sp>
+      <p:sp>
+        <p:nvSpPr>
+          <p:cNvPr id="28675" name="Rectangle 2"/>
+          <p:cNvSpPr>
+            <a:spLocks noGrp="1" noRot="1" noChangeAspect="1" noChangeArrowheads="1" noTextEdit="1"/>
+          </p:cNvSpPr>
+          <p:nvPr>
+            <p:ph type="sldImg"/>
+          </p:nvPr>
+        </p:nvSpPr>
+        <p:spPr>
+          <a:xfrm>
+            <a:off x="2974975" y="549275"/>
+            <a:ext cx="3657600" cy="2743200"/>
+          </a:xfrm>
+          <a:ln/>
+        </p:spPr>
+      </p:sp>
+      <p:sp>
+        <p:nvSpPr>
+          <p:cNvPr id="28676" name="Rectangle 3"/>
+          <p:cNvSpPr>
+            <a:spLocks noGrp="1" noChangeArrowheads="1"/>
+          </p:cNvSpPr>
+          <p:nvPr>
+            <p:ph type="body" idx="1"/>
+          </p:nvPr>
+        </p:nvSpPr>
+        <p:spPr>
+          <a:noFill/>
+          <a:ln/>
+        </p:spPr>
+        <p:txBody>
+          <a:bodyPr/>
+          <a:lstStyle/>
+          <a:p>
+            <a:pPr eaLnBrk="1" hangingPunct="1"/>
+            <a:endParaRPr lang="en-US" smtClean="0">
+              <a:latin typeface="Times New Roman" pitchFamily="8" charset="0"/>
+            </a:endParaRPr>
+          </a:p>
+        </p:txBody>
+      </p:sp>
+    </p:spTree>
+  </p:cSld>
+  <p:clrMapOvr>
+    <a:masterClrMapping/>
+  </p:clrMapOvr>
+</p:notes>
+</file>
+
+<file path=ppt/notesSlides/notesSlide17.xml><?xml version="1.0" encoding="utf-8"?>
+<p:notes xmlns:a="http://schemas.openxmlformats.org/drawingml/2006/main" xmlns:r="http://schemas.openxmlformats.org/officeDocument/2006/relationships" xmlns:p="http://schemas.openxmlformats.org/presentationml/2006/main">
+  <p:cSld>
+    <p:spTree>
+      <p:nvGrpSpPr>
+        <p:cNvPr id="1" name=""/>
+        <p:cNvGrpSpPr/>
+        <p:nvPr/>
+      </p:nvGrpSpPr>
+      <p:grpSpPr>
+        <a:xfrm>
+          <a:off x="0" y="0"/>
+          <a:ext cx="0" cy="0"/>
+          <a:chOff x="0" y="0"/>
+          <a:chExt cx="0" cy="0"/>
+        </a:xfrm>
+      </p:grpSpPr>
+      <p:sp>
+        <p:nvSpPr>
+          <p:cNvPr id="35842" name="Rectangle 7"/>
+          <p:cNvSpPr>
+            <a:spLocks noGrp="1" noChangeArrowheads="1"/>
+          </p:cNvSpPr>
+          <p:nvPr>
+            <p:ph type="sldNum" sz="quarter" idx="5"/>
+          </p:nvPr>
+        </p:nvSpPr>
+        <p:spPr>
+          <a:noFill/>
+        </p:spPr>
+        <p:txBody>
+          <a:bodyPr/>
+          <a:lstStyle/>
+          <a:p>
             <a:fld id="{37ECF619-DC5D-4598-B0E9-D0DECFF1B600}" type="slidenum">
               <a:rPr lang="en-US" smtClean="0">
                 <a:latin typeface="Times New Roman" pitchFamily="8" charset="0"/>
               </a:rPr>
               <a:pPr/>
-              <a:t>16</a:t>
+              <a:t>19</a:t>
             </a:fld>
             <a:endParaRPr lang="en-US" smtClean="0">
               <a:latin typeface="Times New Roman" pitchFamily="8" charset="0"/>
@@ -5602,6 +5899,649 @@
           <a:chExt cx="0" cy="0"/>
         </a:xfrm>
       </p:grpSpPr>
+      <p:cxnSp>
+        <p:nvCxnSpPr>
+          <p:cNvPr id="17429" name="AutoShape 22"/>
+          <p:cNvCxnSpPr>
+            <a:cxnSpLocks noChangeShapeType="1"/>
+            <a:stCxn id="17415" idx="6"/>
+            <a:endCxn id="17419" idx="2"/>
+          </p:cNvCxnSpPr>
+          <p:nvPr/>
+        </p:nvCxnSpPr>
+        <p:spPr bwMode="auto">
+          <a:xfrm>
+            <a:off x="5088242" y="3813058"/>
+            <a:ext cx="2823315" cy="0"/>
+          </a:xfrm>
+          <a:prstGeom prst="straightConnector1">
+            <a:avLst/>
+          </a:prstGeom>
+          <a:noFill/>
+          <a:ln w="25400">
+            <a:solidFill>
+              <a:schemeClr val="tx1"/>
+            </a:solidFill>
+            <a:round/>
+            <a:headEnd/>
+            <a:tailEnd type="none" w="lg" len="lg"/>
+          </a:ln>
+        </p:spPr>
+      </p:cxnSp>
+      <p:sp>
+        <p:nvSpPr>
+          <p:cNvPr id="17411" name="Oval 4"/>
+          <p:cNvSpPr>
+            <a:spLocks noChangeArrowheads="1"/>
+          </p:cNvSpPr>
+          <p:nvPr/>
+        </p:nvSpPr>
+        <p:spPr bwMode="auto">
+          <a:xfrm>
+            <a:off x="931333" y="1744143"/>
+            <a:ext cx="377309" cy="419082"/>
+          </a:xfrm>
+          <a:prstGeom prst="ellipse">
+            <a:avLst/>
+          </a:prstGeom>
+          <a:solidFill>
+            <a:srgbClr val="0066FF"/>
+          </a:solidFill>
+          <a:ln w="25400">
+            <a:solidFill>
+              <a:schemeClr val="tx1"/>
+            </a:solidFill>
+            <a:round/>
+            <a:headEnd/>
+            <a:tailEnd type="none" w="lg" len="lg"/>
+          </a:ln>
+        </p:spPr>
+        <p:txBody>
+          <a:bodyPr wrap="none" anchor="ctr"/>
+          <a:lstStyle/>
+          <a:p>
+            <a:endParaRPr lang="en-US"/>
+          </a:p>
+        </p:txBody>
+      </p:sp>
+      <p:sp>
+        <p:nvSpPr>
+          <p:cNvPr id="17412" name="Oval 5"/>
+          <p:cNvSpPr>
+            <a:spLocks noChangeArrowheads="1"/>
+          </p:cNvSpPr>
+          <p:nvPr/>
+        </p:nvSpPr>
+        <p:spPr bwMode="auto">
+          <a:xfrm>
+            <a:off x="2254084" y="2965261"/>
+            <a:ext cx="377309" cy="419082"/>
+          </a:xfrm>
+          <a:prstGeom prst="ellipse">
+            <a:avLst/>
+          </a:prstGeom>
+          <a:solidFill>
+            <a:srgbClr val="0066FF"/>
+          </a:solidFill>
+          <a:ln w="25400">
+            <a:solidFill>
+              <a:schemeClr val="tx1"/>
+            </a:solidFill>
+            <a:round/>
+            <a:headEnd/>
+            <a:tailEnd type="none" w="lg" len="lg"/>
+          </a:ln>
+        </p:spPr>
+        <p:txBody>
+          <a:bodyPr wrap="none" anchor="ctr"/>
+          <a:lstStyle/>
+          <a:p>
+            <a:endParaRPr lang="en-US"/>
+          </a:p>
+        </p:txBody>
+      </p:sp>
+      <p:sp>
+        <p:nvSpPr>
+          <p:cNvPr id="17413" name="Oval 6"/>
+          <p:cNvSpPr>
+            <a:spLocks noChangeArrowheads="1"/>
+          </p:cNvSpPr>
+          <p:nvPr/>
+        </p:nvSpPr>
+        <p:spPr bwMode="auto">
+          <a:xfrm>
+            <a:off x="3765491" y="1744143"/>
+            <a:ext cx="377309" cy="419082"/>
+          </a:xfrm>
+          <a:prstGeom prst="ellipse">
+            <a:avLst/>
+          </a:prstGeom>
+          <a:solidFill>
+            <a:srgbClr val="0066FF"/>
+          </a:solidFill>
+          <a:ln w="25400">
+            <a:solidFill>
+              <a:schemeClr val="tx1"/>
+            </a:solidFill>
+            <a:round/>
+            <a:headEnd/>
+            <a:tailEnd type="none" w="lg" len="lg"/>
+          </a:ln>
+        </p:spPr>
+        <p:txBody>
+          <a:bodyPr wrap="none" anchor="ctr"/>
+          <a:lstStyle/>
+          <a:p>
+            <a:endParaRPr lang="en-US"/>
+          </a:p>
+        </p:txBody>
+      </p:sp>
+      <p:sp>
+        <p:nvSpPr>
+          <p:cNvPr id="17414" name="Oval 7"/>
+          <p:cNvSpPr>
+            <a:spLocks noChangeArrowheads="1"/>
+          </p:cNvSpPr>
+          <p:nvPr/>
+        </p:nvSpPr>
+        <p:spPr bwMode="auto">
+          <a:xfrm>
+            <a:off x="2254084" y="4643994"/>
+            <a:ext cx="377309" cy="419082"/>
+          </a:xfrm>
+          <a:prstGeom prst="ellipse">
+            <a:avLst/>
+          </a:prstGeom>
+          <a:solidFill>
+            <a:srgbClr val="0066FF"/>
+          </a:solidFill>
+          <a:ln w="25400">
+            <a:solidFill>
+              <a:schemeClr val="tx1"/>
+            </a:solidFill>
+            <a:round/>
+            <a:headEnd/>
+            <a:tailEnd type="none" w="lg" len="lg"/>
+          </a:ln>
+        </p:spPr>
+        <p:txBody>
+          <a:bodyPr wrap="none" anchor="ctr"/>
+          <a:lstStyle/>
+          <a:p>
+            <a:endParaRPr lang="en-US"/>
+          </a:p>
+        </p:txBody>
+      </p:sp>
+      <p:sp>
+        <p:nvSpPr>
+          <p:cNvPr id="17415" name="Oval 8"/>
+          <p:cNvSpPr>
+            <a:spLocks noChangeArrowheads="1"/>
+          </p:cNvSpPr>
+          <p:nvPr/>
+        </p:nvSpPr>
+        <p:spPr bwMode="auto">
+          <a:xfrm>
+            <a:off x="4708763" y="3603516"/>
+            <a:ext cx="379478" cy="419082"/>
+          </a:xfrm>
+          <a:prstGeom prst="ellipse">
+            <a:avLst/>
+          </a:prstGeom>
+          <a:solidFill>
+            <a:srgbClr val="0066FF"/>
+          </a:solidFill>
+          <a:ln w="25400">
+            <a:solidFill>
+              <a:schemeClr val="tx1"/>
+            </a:solidFill>
+            <a:round/>
+            <a:headEnd/>
+            <a:tailEnd type="none" w="lg" len="lg"/>
+          </a:ln>
+        </p:spPr>
+        <p:txBody>
+          <a:bodyPr wrap="none" anchor="ctr"/>
+          <a:lstStyle/>
+          <a:p>
+            <a:endParaRPr lang="en-US"/>
+          </a:p>
+        </p:txBody>
+      </p:sp>
+      <p:sp>
+        <p:nvSpPr>
+          <p:cNvPr id="17416" name="Oval 9"/>
+          <p:cNvSpPr>
+            <a:spLocks noChangeArrowheads="1"/>
+          </p:cNvSpPr>
+          <p:nvPr/>
+        </p:nvSpPr>
+        <p:spPr bwMode="auto">
+          <a:xfrm>
+            <a:off x="3954145" y="4643994"/>
+            <a:ext cx="377309" cy="419082"/>
+          </a:xfrm>
+          <a:prstGeom prst="ellipse">
+            <a:avLst/>
+          </a:prstGeom>
+          <a:solidFill>
+            <a:srgbClr val="0066FF"/>
+          </a:solidFill>
+          <a:ln w="25400">
+            <a:solidFill>
+              <a:schemeClr val="tx1"/>
+            </a:solidFill>
+            <a:round/>
+            <a:headEnd/>
+            <a:tailEnd type="none" w="lg" len="lg"/>
+          </a:ln>
+        </p:spPr>
+        <p:txBody>
+          <a:bodyPr wrap="none" anchor="ctr"/>
+          <a:lstStyle/>
+          <a:p>
+            <a:endParaRPr lang="en-US"/>
+          </a:p>
+        </p:txBody>
+      </p:sp>
+      <p:sp>
+        <p:nvSpPr>
+          <p:cNvPr id="17417" name="Oval 10"/>
+          <p:cNvSpPr>
+            <a:spLocks noChangeArrowheads="1"/>
+          </p:cNvSpPr>
+          <p:nvPr/>
+        </p:nvSpPr>
+        <p:spPr bwMode="auto">
+          <a:xfrm>
+            <a:off x="5901408" y="1744143"/>
+            <a:ext cx="377309" cy="419082"/>
+          </a:xfrm>
+          <a:prstGeom prst="ellipse">
+            <a:avLst/>
+          </a:prstGeom>
+          <a:solidFill>
+            <a:srgbClr val="0066FF"/>
+          </a:solidFill>
+          <a:ln w="25400">
+            <a:solidFill>
+              <a:schemeClr val="tx1"/>
+            </a:solidFill>
+            <a:round/>
+            <a:headEnd/>
+            <a:tailEnd type="none" w="lg" len="lg"/>
+          </a:ln>
+        </p:spPr>
+        <p:txBody>
+          <a:bodyPr wrap="none" anchor="ctr"/>
+          <a:lstStyle/>
+          <a:p>
+            <a:endParaRPr lang="en-US"/>
+          </a:p>
+        </p:txBody>
+      </p:sp>
+      <p:sp>
+        <p:nvSpPr>
+          <p:cNvPr id="17418" name="Oval 11"/>
+          <p:cNvSpPr>
+            <a:spLocks noChangeArrowheads="1"/>
+          </p:cNvSpPr>
+          <p:nvPr/>
+        </p:nvSpPr>
+        <p:spPr bwMode="auto">
+          <a:xfrm>
+            <a:off x="5899240" y="4643994"/>
+            <a:ext cx="377309" cy="419082"/>
+          </a:xfrm>
+          <a:prstGeom prst="ellipse">
+            <a:avLst/>
+          </a:prstGeom>
+          <a:solidFill>
+            <a:srgbClr val="0066FF"/>
+          </a:solidFill>
+          <a:ln w="25400">
+            <a:solidFill>
+              <a:schemeClr val="tx1"/>
+            </a:solidFill>
+            <a:round/>
+            <a:headEnd/>
+            <a:tailEnd type="none" w="lg" len="lg"/>
+          </a:ln>
+        </p:spPr>
+        <p:txBody>
+          <a:bodyPr wrap="none" anchor="ctr"/>
+          <a:lstStyle/>
+          <a:p>
+            <a:endParaRPr lang="en-US"/>
+          </a:p>
+        </p:txBody>
+      </p:sp>
+      <p:sp>
+        <p:nvSpPr>
+          <p:cNvPr id="17419" name="Oval 12"/>
+          <p:cNvSpPr>
+            <a:spLocks noChangeArrowheads="1"/>
+          </p:cNvSpPr>
+          <p:nvPr/>
+        </p:nvSpPr>
+        <p:spPr bwMode="auto">
+          <a:xfrm>
+            <a:off x="7911557" y="3603516"/>
+            <a:ext cx="377309" cy="419082"/>
+          </a:xfrm>
+          <a:prstGeom prst="ellipse">
+            <a:avLst/>
+          </a:prstGeom>
+          <a:solidFill>
+            <a:srgbClr val="0066FF"/>
+          </a:solidFill>
+          <a:ln w="25400">
+            <a:solidFill>
+              <a:schemeClr val="tx1"/>
+            </a:solidFill>
+            <a:round/>
+            <a:headEnd/>
+            <a:tailEnd type="none" w="lg" len="lg"/>
+          </a:ln>
+        </p:spPr>
+        <p:txBody>
+          <a:bodyPr wrap="none" anchor="ctr"/>
+          <a:lstStyle/>
+          <a:p>
+            <a:endParaRPr lang="en-US"/>
+          </a:p>
+        </p:txBody>
+      </p:sp>
+      <p:cxnSp>
+        <p:nvCxnSpPr>
+          <p:cNvPr id="17420" name="AutoShape 13"/>
+          <p:cNvCxnSpPr>
+            <a:cxnSpLocks noChangeShapeType="1"/>
+            <a:stCxn id="17411" idx="5"/>
+            <a:endCxn id="17412" idx="1"/>
+          </p:cNvCxnSpPr>
+          <p:nvPr/>
+        </p:nvCxnSpPr>
+        <p:spPr bwMode="auto">
+          <a:xfrm>
+            <a:off x="1254432" y="2103012"/>
+            <a:ext cx="1053864" cy="922460"/>
+          </a:xfrm>
+          <a:prstGeom prst="straightConnector1">
+            <a:avLst/>
+          </a:prstGeom>
+          <a:noFill/>
+          <a:ln w="25400">
+            <a:solidFill>
+              <a:schemeClr val="tx1"/>
+            </a:solidFill>
+            <a:round/>
+            <a:headEnd/>
+            <a:tailEnd type="none" w="lg" len="lg"/>
+          </a:ln>
+        </p:spPr>
+      </p:cxnSp>
+      <p:cxnSp>
+        <p:nvCxnSpPr>
+          <p:cNvPr id="17421" name="AutoShape 14"/>
+          <p:cNvCxnSpPr>
+            <a:cxnSpLocks noChangeShapeType="1"/>
+            <a:stCxn id="17412" idx="7"/>
+            <a:endCxn id="17413" idx="3"/>
+          </p:cNvCxnSpPr>
+          <p:nvPr/>
+        </p:nvCxnSpPr>
+        <p:spPr bwMode="auto">
+          <a:xfrm flipV="1">
+            <a:off x="2577183" y="2103012"/>
+            <a:ext cx="1242518" cy="922460"/>
+          </a:xfrm>
+          <a:prstGeom prst="straightConnector1">
+            <a:avLst/>
+          </a:prstGeom>
+          <a:noFill/>
+          <a:ln w="25400">
+            <a:solidFill>
+              <a:schemeClr val="tx1"/>
+            </a:solidFill>
+            <a:round/>
+            <a:headEnd/>
+            <a:tailEnd type="none" w="lg" len="lg"/>
+          </a:ln>
+        </p:spPr>
+      </p:cxnSp>
+      <p:cxnSp>
+        <p:nvCxnSpPr>
+          <p:cNvPr id="17422" name="AutoShape 15"/>
+          <p:cNvCxnSpPr>
+            <a:cxnSpLocks noChangeShapeType="1"/>
+            <a:stCxn id="17413" idx="2"/>
+            <a:endCxn id="17411" idx="6"/>
+          </p:cNvCxnSpPr>
+          <p:nvPr/>
+        </p:nvCxnSpPr>
+        <p:spPr bwMode="auto">
+          <a:xfrm flipH="1">
+            <a:off x="1308642" y="1953685"/>
+            <a:ext cx="2456848" cy="0"/>
+          </a:xfrm>
+          <a:prstGeom prst="straightConnector1">
+            <a:avLst/>
+          </a:prstGeom>
+          <a:noFill/>
+          <a:ln w="25400">
+            <a:solidFill>
+              <a:schemeClr val="tx1"/>
+            </a:solidFill>
+            <a:round/>
+            <a:headEnd/>
+            <a:tailEnd type="none" w="lg" len="lg"/>
+          </a:ln>
+        </p:spPr>
+      </p:cxnSp>
+      <p:cxnSp>
+        <p:nvCxnSpPr>
+          <p:cNvPr id="17423" name="AutoShape 16"/>
+          <p:cNvCxnSpPr>
+            <a:cxnSpLocks noChangeShapeType="1"/>
+            <a:stCxn id="17412" idx="4"/>
+            <a:endCxn id="17414" idx="0"/>
+          </p:cNvCxnSpPr>
+          <p:nvPr/>
+        </p:nvCxnSpPr>
+        <p:spPr bwMode="auto">
+          <a:xfrm>
+            <a:off x="2442740" y="3384342"/>
+            <a:ext cx="0" cy="1259652"/>
+          </a:xfrm>
+          <a:prstGeom prst="straightConnector1">
+            <a:avLst/>
+          </a:prstGeom>
+          <a:noFill/>
+          <a:ln w="25400">
+            <a:solidFill>
+              <a:schemeClr val="tx1"/>
+            </a:solidFill>
+            <a:round/>
+            <a:headEnd/>
+            <a:tailEnd type="none" w="lg" len="lg"/>
+          </a:ln>
+        </p:spPr>
+      </p:cxnSp>
+      <p:cxnSp>
+        <p:nvCxnSpPr>
+          <p:cNvPr id="17424" name="AutoShape 17"/>
+          <p:cNvCxnSpPr>
+            <a:cxnSpLocks noChangeShapeType="1"/>
+            <a:stCxn id="17414" idx="6"/>
+            <a:endCxn id="17416" idx="2"/>
+          </p:cNvCxnSpPr>
+          <p:nvPr/>
+        </p:nvCxnSpPr>
+        <p:spPr bwMode="auto">
+          <a:xfrm>
+            <a:off x="2631394" y="4853536"/>
+            <a:ext cx="1322751" cy="0"/>
+          </a:xfrm>
+          <a:prstGeom prst="straightConnector1">
+            <a:avLst/>
+          </a:prstGeom>
+          <a:noFill/>
+          <a:ln w="25400">
+            <a:solidFill>
+              <a:schemeClr val="tx1"/>
+            </a:solidFill>
+            <a:round/>
+            <a:headEnd/>
+            <a:tailEnd type="none" w="lg" len="lg"/>
+          </a:ln>
+        </p:spPr>
+      </p:cxnSp>
+      <p:cxnSp>
+        <p:nvCxnSpPr>
+          <p:cNvPr id="17425" name="AutoShape 18"/>
+          <p:cNvCxnSpPr>
+            <a:cxnSpLocks noChangeShapeType="1"/>
+            <a:stCxn id="17416" idx="7"/>
+            <a:endCxn id="17415" idx="4"/>
+          </p:cNvCxnSpPr>
+          <p:nvPr/>
+        </p:nvCxnSpPr>
+        <p:spPr bwMode="auto">
+          <a:xfrm flipV="1">
+            <a:off x="4277244" y="4022598"/>
+            <a:ext cx="622343" cy="681610"/>
+          </a:xfrm>
+          <a:prstGeom prst="straightConnector1">
+            <a:avLst/>
+          </a:prstGeom>
+          <a:noFill/>
+          <a:ln w="25400">
+            <a:solidFill>
+              <a:schemeClr val="tx1"/>
+            </a:solidFill>
+            <a:round/>
+            <a:headEnd/>
+            <a:tailEnd type="none" w="lg" len="lg"/>
+          </a:ln>
+        </p:spPr>
+      </p:cxnSp>
+      <p:cxnSp>
+        <p:nvCxnSpPr>
+          <p:cNvPr id="17426" name="AutoShape 19"/>
+          <p:cNvCxnSpPr>
+            <a:cxnSpLocks noChangeShapeType="1"/>
+            <a:stCxn id="17419" idx="3"/>
+            <a:endCxn id="17418" idx="7"/>
+          </p:cNvCxnSpPr>
+          <p:nvPr/>
+        </p:nvCxnSpPr>
+        <p:spPr bwMode="auto">
+          <a:xfrm flipH="1">
+            <a:off x="6222338" y="3962386"/>
+            <a:ext cx="1743429" cy="741822"/>
+          </a:xfrm>
+          <a:prstGeom prst="straightConnector1">
+            <a:avLst/>
+          </a:prstGeom>
+          <a:noFill/>
+          <a:ln w="25400">
+            <a:solidFill>
+              <a:schemeClr val="tx1"/>
+            </a:solidFill>
+            <a:round/>
+            <a:headEnd/>
+            <a:tailEnd type="none" w="lg" len="lg"/>
+          </a:ln>
+        </p:spPr>
+      </p:cxnSp>
+      <p:cxnSp>
+        <p:nvCxnSpPr>
+          <p:cNvPr id="17427" name="AutoShape 20"/>
+          <p:cNvCxnSpPr>
+            <a:cxnSpLocks noChangeShapeType="1"/>
+            <a:stCxn id="17417" idx="5"/>
+            <a:endCxn id="17419" idx="1"/>
+          </p:cNvCxnSpPr>
+          <p:nvPr/>
+        </p:nvCxnSpPr>
+        <p:spPr bwMode="auto">
+          <a:xfrm>
+            <a:off x="6224507" y="2103012"/>
+            <a:ext cx="1741260" cy="1560717"/>
+          </a:xfrm>
+          <a:prstGeom prst="straightConnector1">
+            <a:avLst/>
+          </a:prstGeom>
+          <a:noFill/>
+          <a:ln w="25400">
+            <a:solidFill>
+              <a:schemeClr val="tx1"/>
+            </a:solidFill>
+            <a:round/>
+            <a:headEnd/>
+            <a:tailEnd type="none" w="lg" len="lg"/>
+          </a:ln>
+        </p:spPr>
+      </p:cxnSp>
+      <p:cxnSp>
+        <p:nvCxnSpPr>
+          <p:cNvPr id="17428" name="AutoShape 21"/>
+          <p:cNvCxnSpPr>
+            <a:cxnSpLocks noChangeShapeType="1"/>
+            <a:stCxn id="17417" idx="4"/>
+            <a:endCxn id="17418" idx="0"/>
+          </p:cNvCxnSpPr>
+          <p:nvPr/>
+        </p:nvCxnSpPr>
+        <p:spPr bwMode="auto">
+          <a:xfrm flipH="1">
+            <a:off x="6087894" y="2163225"/>
+            <a:ext cx="2169" cy="2480770"/>
+          </a:xfrm>
+          <a:prstGeom prst="straightConnector1">
+            <a:avLst/>
+          </a:prstGeom>
+          <a:noFill/>
+          <a:ln w="25400">
+            <a:solidFill>
+              <a:schemeClr val="tx1"/>
+            </a:solidFill>
+            <a:round/>
+            <a:headEnd/>
+            <a:tailEnd type="none" w="lg" len="lg"/>
+          </a:ln>
+        </p:spPr>
+      </p:cxnSp>
+      <p:cxnSp>
+        <p:nvCxnSpPr>
+          <p:cNvPr id="17430" name="AutoShape 24"/>
+          <p:cNvCxnSpPr>
+            <a:cxnSpLocks noChangeShapeType="1"/>
+            <a:stCxn id="17413" idx="5"/>
+            <a:endCxn id="17415" idx="1"/>
+          </p:cNvCxnSpPr>
+          <p:nvPr/>
+        </p:nvCxnSpPr>
+        <p:spPr bwMode="auto">
+          <a:xfrm>
+            <a:off x="4088588" y="2103012"/>
+            <a:ext cx="676555" cy="1560717"/>
+          </a:xfrm>
+          <a:prstGeom prst="straightConnector1">
+            <a:avLst/>
+          </a:prstGeom>
+          <a:noFill/>
+          <a:ln w="25400">
+            <a:solidFill>
+              <a:schemeClr val="tx1"/>
+            </a:solidFill>
+            <a:round/>
+            <a:headEnd/>
+            <a:tailEnd type="none" w="lg" len="lg"/>
+          </a:ln>
+        </p:spPr>
+      </p:cxnSp>
       <p:sp>
         <p:nvSpPr>
           <p:cNvPr id="17410" name="Rectangle 2"/>
@@ -5632,7 +6572,7 @@
                   <a:schemeClr val="tx1"/>
                 </a:solidFill>
               </a:rPr>
-              <a:t>-vertex</a:t>
+              <a:t>-edge</a:t>
             </a:r>
             <a:r>
               <a:rPr lang="en-US" sz="4000" dirty="0" smtClean="0">
@@ -5688,14 +6628,14 @@
       </p:sp>
       <p:sp>
         <p:nvSpPr>
-          <p:cNvPr id="44" name="TextBox 43"/>
+          <p:cNvPr id="30" name="TextBox 29"/>
           <p:cNvSpPr txBox="1"/>
           <p:nvPr/>
         </p:nvSpPr>
         <p:spPr>
           <a:xfrm>
-            <a:off x="486430" y="1461562"/>
-            <a:ext cx="8152091" cy="3785652"/>
+            <a:off x="2222267" y="5604934"/>
+            <a:ext cx="4864583" cy="769441"/>
           </a:xfrm>
           <a:prstGeom prst="rect">
             <a:avLst/>
@@ -5709,60 +6649,97 @@
           <a:lstStyle/>
           <a:p>
             <a:r>
-              <a:rPr lang="en-US" sz="8000" dirty="0" smtClean="0">
+              <a:rPr lang="en-US" sz="4400" dirty="0" smtClean="0">
                 <a:solidFill>
                   <a:srgbClr val="0000FF"/>
                 </a:solidFill>
                 <a:latin typeface="+mj-lt"/>
               </a:rPr>
-              <a:t>k</a:t>
-            </a:r>
-            <a:r>
-              <a:rPr lang="en-US" sz="8000" dirty="0" smtClean="0">
+              <a:t>2</a:t>
+            </a:r>
+            <a:r>
+              <a:rPr lang="en-US" sz="4400" dirty="0" smtClean="0">
                 <a:latin typeface="+mj-lt"/>
               </a:rPr>
               <a:t>-</a:t>
             </a:r>
             <a:r>
-              <a:rPr lang="en-US" sz="8000" dirty="0" smtClean="0">
-                <a:solidFill>
-                  <a:srgbClr val="930093"/>
-                </a:solidFill>
+              <a:rPr lang="en-US" sz="4400" dirty="0" smtClean="0">
                 <a:latin typeface="+mj-lt"/>
               </a:rPr>
-              <a:t>vertex</a:t>
-            </a:r>
-          </a:p>
-          <a:p>
-            <a:r>
-              <a:rPr lang="en-US" sz="8000" dirty="0" smtClean="0">
-                <a:solidFill>
-                  <a:srgbClr val="930093"/>
-                </a:solidFill>
+              <a:t>edge connected</a:t>
+            </a:r>
+            <a:endParaRPr lang="en-US" sz="4400" dirty="0">
+              <a:latin typeface="+mj-lt"/>
+            </a:endParaRPr>
+          </a:p>
+        </p:txBody>
+      </p:sp>
+      <p:sp>
+        <p:nvSpPr>
+          <p:cNvPr id="44" name="TextBox 43"/>
+          <p:cNvSpPr txBox="1"/>
+          <p:nvPr/>
+        </p:nvSpPr>
+        <p:spPr>
+          <a:xfrm>
+            <a:off x="2057959" y="903642"/>
+            <a:ext cx="5104282" cy="769441"/>
+          </a:xfrm>
+          <a:prstGeom prst="rect">
+            <a:avLst/>
+          </a:prstGeom>
+          <a:noFill/>
+        </p:spPr>
+        <p:txBody>
+          <a:bodyPr wrap="none" rtlCol="0">
+            <a:spAutoFit/>
+          </a:bodyPr>
+          <a:lstStyle/>
+          <a:p>
+            <a:r>
+              <a:rPr lang="en-US" sz="4400" dirty="0" smtClean="0">
                 <a:latin typeface="+mj-lt"/>
               </a:rPr>
-              <a:t>connectedness</a:t>
-            </a:r>
-          </a:p>
-          <a:p>
-            <a:pPr>
-              <a:spcAft>
-                <a:spcPts val="2400"/>
-              </a:spcAft>
-            </a:pPr>
-            <a:r>
-              <a:rPr lang="en-US" sz="8000" dirty="0" smtClean="0">
-                <a:latin typeface="+mj-lt"/>
-              </a:rPr>
-              <a:t>defined similarly</a:t>
-            </a:r>
-          </a:p>
-        </p:txBody>
-      </p:sp>
+              <a:t>this whole graph is</a:t>
+            </a:r>
+          </a:p>
+        </p:txBody>
+      </p:sp>
+      <p:cxnSp>
+        <p:nvCxnSpPr>
+          <p:cNvPr id="3" name="Straight Connector 2"/>
+          <p:cNvCxnSpPr>
+            <a:stCxn id="17415" idx="7"/>
+            <a:endCxn id="17417" idx="3"/>
+          </p:cNvCxnSpPr>
+          <p:nvPr/>
+        </p:nvCxnSpPr>
+        <p:spPr bwMode="auto">
+          <a:xfrm flipV="1">
+            <a:off x="5032668" y="2101852"/>
+            <a:ext cx="923996" cy="1563037"/>
+          </a:xfrm>
+          <a:prstGeom prst="line">
+            <a:avLst/>
+          </a:prstGeom>
+          <a:noFill/>
+          <a:ln w="38100" cap="flat" cmpd="sng" algn="ctr">
+            <a:solidFill>
+              <a:schemeClr val="tx1"/>
+            </a:solidFill>
+            <a:prstDash val="solid"/>
+            <a:round/>
+            <a:headEnd type="none" w="med" len="med"/>
+            <a:tailEnd type="none" w="lg" len="lg"/>
+          </a:ln>
+          <a:effectLst/>
+        </p:spPr>
+      </p:cxnSp>
     </p:spTree>
     <p:extLst>
       <p:ext uri="{BB962C8B-B14F-4D97-AF65-F5344CB8AC3E}">
-        <p14:creationId xmlns:p14="http://schemas.microsoft.com/office/powerpoint/2010/main" val="2493279849"/>
+        <p14:creationId xmlns:p14="http://schemas.microsoft.com/office/powerpoint/2010/main" val="1664482980"/>
       </p:ext>
     </p:extLst>
   </p:cSld>
@@ -5770,7 +6747,7 @@
     <a:masterClrMapping/>
   </p:clrMapOvr>
   <p:transition xmlns:p14="http://schemas.microsoft.com/office/powerpoint/2010/main" spd="slow">
-    <p:fade thruBlk="1"/>
+    <p:fade/>
   </p:transition>
   <p:timing>
     <p:tnLst>
@@ -5891,7 +6868,204 @@
         </p:nvSpPr>
         <p:spPr>
           <a:xfrm>
-            <a:off x="976822" y="912386"/>
+            <a:off x="486430" y="1461562"/>
+            <a:ext cx="8152091" cy="3785652"/>
+          </a:xfrm>
+          <a:prstGeom prst="rect">
+            <a:avLst/>
+          </a:prstGeom>
+          <a:noFill/>
+        </p:spPr>
+        <p:txBody>
+          <a:bodyPr wrap="none" rtlCol="0">
+            <a:spAutoFit/>
+          </a:bodyPr>
+          <a:lstStyle/>
+          <a:p>
+            <a:r>
+              <a:rPr lang="en-US" sz="8000" dirty="0" smtClean="0">
+                <a:solidFill>
+                  <a:srgbClr val="0000FF"/>
+                </a:solidFill>
+                <a:latin typeface="+mj-lt"/>
+              </a:rPr>
+              <a:t>k</a:t>
+            </a:r>
+            <a:r>
+              <a:rPr lang="en-US" sz="8000" dirty="0" smtClean="0">
+                <a:latin typeface="+mj-lt"/>
+              </a:rPr>
+              <a:t>-</a:t>
+            </a:r>
+            <a:r>
+              <a:rPr lang="en-US" sz="8000" dirty="0" smtClean="0">
+                <a:solidFill>
+                  <a:srgbClr val="930093"/>
+                </a:solidFill>
+                <a:latin typeface="+mj-lt"/>
+              </a:rPr>
+              <a:t>vertex</a:t>
+            </a:r>
+          </a:p>
+          <a:p>
+            <a:r>
+              <a:rPr lang="en-US" sz="8000" dirty="0" smtClean="0">
+                <a:solidFill>
+                  <a:srgbClr val="930093"/>
+                </a:solidFill>
+                <a:latin typeface="+mj-lt"/>
+              </a:rPr>
+              <a:t>connectedness</a:t>
+            </a:r>
+          </a:p>
+          <a:p>
+            <a:pPr>
+              <a:spcAft>
+                <a:spcPts val="2400"/>
+              </a:spcAft>
+            </a:pPr>
+            <a:r>
+              <a:rPr lang="en-US" sz="8000" dirty="0" smtClean="0">
+                <a:latin typeface="+mj-lt"/>
+              </a:rPr>
+              <a:t>defined similarly</a:t>
+            </a:r>
+          </a:p>
+        </p:txBody>
+      </p:sp>
+    </p:spTree>
+    <p:extLst>
+      <p:ext uri="{BB962C8B-B14F-4D97-AF65-F5344CB8AC3E}">
+        <p14:creationId xmlns:p14="http://schemas.microsoft.com/office/powerpoint/2010/main" val="2493279849"/>
+      </p:ext>
+    </p:extLst>
+  </p:cSld>
+  <p:clrMapOvr>
+    <a:masterClrMapping/>
+  </p:clrMapOvr>
+  <p:transition xmlns:p14="http://schemas.microsoft.com/office/powerpoint/2010/main" spd="slow">
+    <p:fade thruBlk="1"/>
+  </p:transition>
+  <p:timing>
+    <p:tnLst>
+      <p:par>
+        <p:cTn xmlns:p14="http://schemas.microsoft.com/office/powerpoint/2010/main" id="1" dur="indefinite" restart="never" nodeType="tmRoot"/>
+      </p:par>
+    </p:tnLst>
+  </p:timing>
+</p:sld>
+</file>
+
+<file path=ppt/slides/slide14.xml><?xml version="1.0" encoding="utf-8"?>
+<p:sld xmlns:a="http://schemas.openxmlformats.org/drawingml/2006/main" xmlns:r="http://schemas.openxmlformats.org/officeDocument/2006/relationships" xmlns:p="http://schemas.openxmlformats.org/presentationml/2006/main">
+  <p:cSld>
+    <p:spTree>
+      <p:nvGrpSpPr>
+        <p:cNvPr id="1" name=""/>
+        <p:cNvGrpSpPr/>
+        <p:nvPr/>
+      </p:nvGrpSpPr>
+      <p:grpSpPr>
+        <a:xfrm>
+          <a:off x="0" y="0"/>
+          <a:ext cx="0" cy="0"/>
+          <a:chOff x="0" y="0"/>
+          <a:chExt cx="0" cy="0"/>
+        </a:xfrm>
+      </p:grpSpPr>
+      <p:sp>
+        <p:nvSpPr>
+          <p:cNvPr id="17410" name="Rectangle 2"/>
+          <p:cNvSpPr>
+            <a:spLocks noGrp="1" noChangeArrowheads="1"/>
+          </p:cNvSpPr>
+          <p:nvPr>
+            <p:ph type="title"/>
+          </p:nvPr>
+        </p:nvSpPr>
+        <p:spPr/>
+        <p:txBody>
+          <a:bodyPr/>
+          <a:lstStyle/>
+          <a:p>
+            <a:pPr eaLnBrk="1" hangingPunct="1"/>
+            <a:r>
+              <a:rPr lang="en-US" sz="4000" dirty="0" smtClean="0">
+                <a:solidFill>
+                  <a:srgbClr val="0000FF"/>
+                </a:solidFill>
+              </a:rPr>
+              <a:t>k</a:t>
+            </a:r>
+            <a:r>
+              <a:rPr lang="en-US" sz="4000" dirty="0" smtClean="0">
+                <a:solidFill>
+                  <a:schemeClr val="tx1"/>
+                </a:solidFill>
+              </a:rPr>
+              <a:t>-vertex</a:t>
+            </a:r>
+            <a:r>
+              <a:rPr lang="en-US" sz="4000" dirty="0" smtClean="0">
+                <a:solidFill>
+                  <a:srgbClr val="0033CC"/>
+                </a:solidFill>
+              </a:rPr>
+              <a:t> </a:t>
+            </a:r>
+            <a:r>
+              <a:rPr lang="en-US" sz="4000" dirty="0" smtClean="0"/>
+              <a:t>Connectedness</a:t>
+            </a:r>
+          </a:p>
+        </p:txBody>
+      </p:sp>
+      <p:sp>
+        <p:nvSpPr>
+          <p:cNvPr id="24" name="Slide Number Placeholder 3"/>
+          <p:cNvSpPr>
+            <a:spLocks noGrp="1"/>
+          </p:cNvSpPr>
+          <p:nvPr>
+            <p:ph type="sldNum" sz="quarter" idx="10"/>
+          </p:nvPr>
+        </p:nvSpPr>
+        <p:spPr/>
+        <p:txBody>
+          <a:bodyPr/>
+          <a:lstStyle/>
+          <a:p>
+            <a:pPr>
+              <a:defRPr/>
+            </a:pPr>
+            <a:r>
+              <a:rPr lang="en-US" dirty="0" err="1"/>
+              <a:t>lec</a:t>
+            </a:r>
+            <a:r>
+              <a:rPr lang="en-US" dirty="0" smtClean="0"/>
+              <a:t> 8M.</a:t>
+            </a:r>
+            <a:fld id="{43E12C49-E36A-496C-9DCA-6E960B9FC41B}" type="slidenum">
+              <a:rPr lang="en-US" smtClean="0"/>
+              <a:pPr>
+                <a:defRPr/>
+              </a:pPr>
+              <a:t>14</a:t>
+            </a:fld>
+            <a:endParaRPr lang="en-US" dirty="0"/>
+          </a:p>
+        </p:txBody>
+      </p:sp>
+      <p:sp>
+        <p:nvSpPr>
+          <p:cNvPr id="44" name="TextBox 43"/>
+          <p:cNvSpPr txBox="1"/>
+          <p:nvPr/>
+        </p:nvSpPr>
+        <p:spPr>
+          <a:xfrm>
+            <a:off x="976822" y="799498"/>
             <a:ext cx="7212582" cy="3847207"/>
           </a:xfrm>
           <a:prstGeom prst="rect">
@@ -5946,18 +7120,11 @@
               <a:t>k</a:t>
             </a:r>
             <a:r>
-              <a:rPr lang="en-US" sz="6000" dirty="0">
-                <a:latin typeface="Comic Sans MS"/>
-                <a:cs typeface="Comic Sans MS"/>
-              </a:rPr>
-              <a:t>-vertex </a:t>
-            </a:r>
-            <a:r>
               <a:rPr lang="en-US" sz="6000" dirty="0" smtClean="0">
                 <a:latin typeface="Comic Sans MS"/>
                 <a:cs typeface="Comic Sans MS"/>
               </a:rPr>
-              <a:t>connected</a:t>
+              <a:t>-edge connected</a:t>
             </a:r>
           </a:p>
           <a:p>
@@ -5983,7 +7150,7 @@
         </p:nvGrpSpPr>
         <p:grpSpPr>
           <a:xfrm rot="5400000">
-            <a:off x="1317208" y="4507832"/>
+            <a:off x="1317208" y="4634831"/>
             <a:ext cx="1605917" cy="1787792"/>
             <a:chOff x="1354685" y="2036129"/>
             <a:chExt cx="2335568" cy="2588970"/>
@@ -6407,6 +7574,34 @@
           </a:p>
         </p:txBody>
       </p:sp>
+      <p:sp>
+        <p:nvSpPr>
+          <p:cNvPr id="2" name="TextBox 1"/>
+          <p:cNvSpPr txBox="1"/>
+          <p:nvPr/>
+        </p:nvSpPr>
+        <p:spPr>
+          <a:xfrm>
+            <a:off x="-1890889" y="5207000"/>
+            <a:ext cx="184666" cy="769441"/>
+          </a:xfrm>
+          <a:prstGeom prst="rect">
+            <a:avLst/>
+          </a:prstGeom>
+          <a:noFill/>
+        </p:spPr>
+        <p:txBody>
+          <a:bodyPr wrap="none" rtlCol="0">
+            <a:spAutoFit/>
+          </a:bodyPr>
+          <a:lstStyle/>
+          <a:p>
+            <a:endParaRPr lang="en-US" sz="4400" dirty="0" smtClean="0">
+              <a:latin typeface="+mj-lt"/>
+            </a:endParaRPr>
+          </a:p>
+        </p:txBody>
+      </p:sp>
     </p:spTree>
     <p:extLst>
       <p:ext uri="{BB962C8B-B14F-4D97-AF65-F5344CB8AC3E}">
@@ -6417,20 +7612,264 @@
   <p:clrMapOvr>
     <a:masterClrMapping/>
   </p:clrMapOvr>
-  <p:transition xmlns:p14="http://schemas.microsoft.com/office/powerpoint/2010/main">
+  <p:transition xmlns:p14="http://schemas.microsoft.com/office/powerpoint/2010/main" spd="slow">
     <p:fade/>
   </p:transition>
   <p:timing>
     <p:tnLst>
       <p:par>
-        <p:cTn xmlns:p14="http://schemas.microsoft.com/office/powerpoint/2010/main" id="1" dur="indefinite" restart="never" nodeType="tmRoot"/>
+        <p:cTn xmlns:p14="http://schemas.microsoft.com/office/powerpoint/2010/main" id="1" dur="indefinite" restart="never" nodeType="tmRoot">
+          <p:childTnLst>
+            <p:seq concurrent="1" nextAc="seek">
+              <p:cTn id="2" dur="indefinite" nodeType="mainSeq">
+                <p:childTnLst>
+                  <p:par>
+                    <p:cTn id="3" fill="hold">
+                      <p:stCondLst>
+                        <p:cond delay="indefinite"/>
+                      </p:stCondLst>
+                      <p:childTnLst>
+                        <p:par>
+                          <p:cTn id="4" fill="hold">
+                            <p:stCondLst>
+                              <p:cond delay="0"/>
+                            </p:stCondLst>
+                            <p:childTnLst>
+                              <p:par>
+                                <p:cTn id="5" presetID="9" presetClass="entr" presetSubtype="0" fill="hold" nodeType="clickEffect">
+                                  <p:stCondLst>
+                                    <p:cond delay="0"/>
+                                  </p:stCondLst>
+                                  <p:childTnLst>
+                                    <p:set>
+                                      <p:cBhvr>
+                                        <p:cTn id="6" dur="1" fill="hold">
+                                          <p:stCondLst>
+                                            <p:cond delay="0"/>
+                                          </p:stCondLst>
+                                        </p:cTn>
+                                        <p:tgtEl>
+                                          <p:spTgt spid="44">
+                                            <p:txEl>
+                                              <p:pRg st="3" end="3"/>
+                                            </p:txEl>
+                                          </p:spTgt>
+                                        </p:tgtEl>
+                                        <p:attrNameLst>
+                                          <p:attrName>style.visibility</p:attrName>
+                                        </p:attrNameLst>
+                                      </p:cBhvr>
+                                      <p:to>
+                                        <p:strVal val="visible"/>
+                                      </p:to>
+                                    </p:set>
+                                    <p:animEffect transition="in" filter="dissolve">
+                                      <p:cBhvr>
+                                        <p:cTn id="7" dur="500"/>
+                                        <p:tgtEl>
+                                          <p:spTgt spid="44">
+                                            <p:txEl>
+                                              <p:pRg st="3" end="3"/>
+                                            </p:txEl>
+                                          </p:spTgt>
+                                        </p:tgtEl>
+                                      </p:cBhvr>
+                                    </p:animEffect>
+                                  </p:childTnLst>
+                                </p:cTn>
+                              </p:par>
+                            </p:childTnLst>
+                          </p:cTn>
+                        </p:par>
+                      </p:childTnLst>
+                    </p:cTn>
+                  </p:par>
+                  <p:par>
+                    <p:cTn id="8" fill="hold">
+                      <p:stCondLst>
+                        <p:cond delay="indefinite"/>
+                      </p:stCondLst>
+                      <p:childTnLst>
+                        <p:par>
+                          <p:cTn id="9" fill="hold">
+                            <p:stCondLst>
+                              <p:cond delay="0"/>
+                            </p:stCondLst>
+                            <p:childTnLst>
+                              <p:par>
+                                <p:cTn id="10" presetID="9" presetClass="entr" presetSubtype="0" fill="hold" nodeType="clickEffect">
+                                  <p:stCondLst>
+                                    <p:cond delay="0"/>
+                                  </p:stCondLst>
+                                  <p:childTnLst>
+                                    <p:set>
+                                      <p:cBhvr>
+                                        <p:cTn id="11" dur="1" fill="hold">
+                                          <p:stCondLst>
+                                            <p:cond delay="0"/>
+                                          </p:stCondLst>
+                                        </p:cTn>
+                                        <p:tgtEl>
+                                          <p:spTgt spid="37"/>
+                                        </p:tgtEl>
+                                        <p:attrNameLst>
+                                          <p:attrName>style.visibility</p:attrName>
+                                        </p:attrNameLst>
+                                      </p:cBhvr>
+                                      <p:to>
+                                        <p:strVal val="visible"/>
+                                      </p:to>
+                                    </p:set>
+                                    <p:animEffect transition="in" filter="dissolve">
+                                      <p:cBhvr>
+                                        <p:cTn id="12" dur="500"/>
+                                        <p:tgtEl>
+                                          <p:spTgt spid="37"/>
+                                        </p:tgtEl>
+                                      </p:cBhvr>
+                                    </p:animEffect>
+                                  </p:childTnLst>
+                                </p:cTn>
+                              </p:par>
+                            </p:childTnLst>
+                          </p:cTn>
+                        </p:par>
+                        <p:par>
+                          <p:cTn id="13" fill="hold">
+                            <p:stCondLst>
+                              <p:cond delay="500"/>
+                            </p:stCondLst>
+                            <p:childTnLst>
+                              <p:par>
+                                <p:cTn id="14" presetID="9" presetClass="entr" presetSubtype="0" fill="hold" grpId="0" nodeType="afterEffect">
+                                  <p:stCondLst>
+                                    <p:cond delay="0"/>
+                                  </p:stCondLst>
+                                  <p:childTnLst>
+                                    <p:set>
+                                      <p:cBhvr>
+                                        <p:cTn id="15" dur="1" fill="hold">
+                                          <p:stCondLst>
+                                            <p:cond delay="0"/>
+                                          </p:stCondLst>
+                                        </p:cTn>
+                                        <p:tgtEl>
+                                          <p:spTgt spid="38">
+                                            <p:txEl>
+                                              <p:pRg st="0" end="0"/>
+                                            </p:txEl>
+                                          </p:spTgt>
+                                        </p:tgtEl>
+                                        <p:attrNameLst>
+                                          <p:attrName>style.visibility</p:attrName>
+                                        </p:attrNameLst>
+                                      </p:cBhvr>
+                                      <p:to>
+                                        <p:strVal val="visible"/>
+                                      </p:to>
+                                    </p:set>
+                                    <p:animEffect transition="in" filter="dissolve">
+                                      <p:cBhvr>
+                                        <p:cTn id="16" dur="500"/>
+                                        <p:tgtEl>
+                                          <p:spTgt spid="38">
+                                            <p:txEl>
+                                              <p:pRg st="0" end="0"/>
+                                            </p:txEl>
+                                          </p:spTgt>
+                                        </p:tgtEl>
+                                      </p:cBhvr>
+                                    </p:animEffect>
+                                  </p:childTnLst>
+                                </p:cTn>
+                              </p:par>
+                            </p:childTnLst>
+                          </p:cTn>
+                        </p:par>
+                        <p:par>
+                          <p:cTn id="17" fill="hold">
+                            <p:stCondLst>
+                              <p:cond delay="1000"/>
+                            </p:stCondLst>
+                            <p:childTnLst>
+                              <p:par>
+                                <p:cTn id="18" presetID="9" presetClass="entr" presetSubtype="0" fill="hold" grpId="0" nodeType="afterEffect">
+                                  <p:stCondLst>
+                                    <p:cond delay="0"/>
+                                  </p:stCondLst>
+                                  <p:childTnLst>
+                                    <p:set>
+                                      <p:cBhvr>
+                                        <p:cTn id="19" dur="1" fill="hold">
+                                          <p:stCondLst>
+                                            <p:cond delay="0"/>
+                                          </p:stCondLst>
+                                        </p:cTn>
+                                        <p:tgtEl>
+                                          <p:spTgt spid="38">
+                                            <p:txEl>
+                                              <p:pRg st="1" end="1"/>
+                                            </p:txEl>
+                                          </p:spTgt>
+                                        </p:tgtEl>
+                                        <p:attrNameLst>
+                                          <p:attrName>style.visibility</p:attrName>
+                                        </p:attrNameLst>
+                                      </p:cBhvr>
+                                      <p:to>
+                                        <p:strVal val="visible"/>
+                                      </p:to>
+                                    </p:set>
+                                    <p:animEffect transition="in" filter="dissolve">
+                                      <p:cBhvr>
+                                        <p:cTn id="20" dur="500"/>
+                                        <p:tgtEl>
+                                          <p:spTgt spid="38">
+                                            <p:txEl>
+                                              <p:pRg st="1" end="1"/>
+                                            </p:txEl>
+                                          </p:spTgt>
+                                        </p:tgtEl>
+                                      </p:cBhvr>
+                                    </p:animEffect>
+                                  </p:childTnLst>
+                                </p:cTn>
+                              </p:par>
+                            </p:childTnLst>
+                          </p:cTn>
+                        </p:par>
+                      </p:childTnLst>
+                    </p:cTn>
+                  </p:par>
+                </p:childTnLst>
+              </p:cTn>
+              <p:prevCondLst>
+                <p:cond evt="onPrev" delay="0">
+                  <p:tgtEl>
+                    <p:sldTgt/>
+                  </p:tgtEl>
+                </p:cond>
+              </p:prevCondLst>
+              <p:nextCondLst>
+                <p:cond evt="onNext" delay="0">
+                  <p:tgtEl>
+                    <p:sldTgt/>
+                  </p:tgtEl>
+                </p:cond>
+              </p:nextCondLst>
+            </p:seq>
+          </p:childTnLst>
+        </p:cTn>
       </p:par>
     </p:tnLst>
+    <p:bldLst>
+      <p:bldP spid="38" grpId="0" build="allAtOnce"/>
+    </p:bldLst>
   </p:timing>
 </p:sld>
 </file>
 
-<file path=ppt/slides/slide14.xml><?xml version="1.0" encoding="utf-8"?>
+<file path=ppt/slides/slide15.xml><?xml version="1.0" encoding="utf-8"?>
 <p:sld xmlns:a="http://schemas.openxmlformats.org/drawingml/2006/main" xmlns:r="http://schemas.openxmlformats.org/officeDocument/2006/relationships" xmlns:p="http://schemas.openxmlformats.org/presentationml/2006/main">
   <p:cSld>
     <p:spTree>
@@ -6477,7 +7916,7 @@
                   <a:schemeClr val="tx1"/>
                 </a:solidFill>
               </a:rPr>
-              <a:t>-edge</a:t>
+              <a:t>-vertex</a:t>
             </a:r>
             <a:r>
               <a:rPr lang="en-US" sz="4000" dirty="0" smtClean="0">
@@ -6502,8 +7941,8 @@
         </p:nvSpPr>
         <p:spPr>
           <a:xfrm>
-            <a:off x="590450" y="1693330"/>
-            <a:ext cx="7944302" cy="3370153"/>
+            <a:off x="605544" y="1180451"/>
+            <a:ext cx="7944302" cy="4616648"/>
           </a:xfrm>
           <a:prstGeom prst="rect">
             <a:avLst/>
@@ -6623,7 +8062,7 @@
               <a:rPr lang="en-US" sz="6600" dirty="0" smtClean="0">
                 <a:latin typeface="+mj-lt"/>
               </a:rPr>
-              <a:t> is </a:t>
+              <a:t> is (</a:t>
             </a:r>
             <a:r>
               <a:rPr lang="en-US" sz="6600" dirty="0" smtClean="0">
@@ -6632,8 +8071,24 @@
                 </a:solidFill>
                 <a:latin typeface="+mj-lt"/>
               </a:rPr>
-              <a:t>n-1 </a:t>
-            </a:r>
+              <a:t>n-1</a:t>
+            </a:r>
+            <a:r>
+              <a:rPr lang="en-US" sz="6600" dirty="0" smtClean="0">
+                <a:solidFill>
+                  <a:srgbClr val="000000"/>
+                </a:solidFill>
+                <a:latin typeface="+mj-lt"/>
+              </a:rPr>
+              <a:t>)-vertex</a:t>
+            </a:r>
+          </a:p>
+          <a:p>
+            <a:pPr>
+              <a:spcAft>
+                <a:spcPts val="1800"/>
+              </a:spcAft>
+            </a:pPr>
             <a:r>
               <a:rPr lang="en-US" sz="6600" dirty="0" smtClean="0">
                 <a:latin typeface="+mj-lt"/>
@@ -6719,6 +8174,49 @@
                                   </p:childTnLst>
                                 </p:cTn>
                               </p:par>
+                              <p:par>
+                                <p:cTn id="8" presetID="9" presetClass="entr" presetSubtype="0" fill="hold" nodeType="withEffect">
+                                  <p:stCondLst>
+                                    <p:cond delay="0"/>
+                                  </p:stCondLst>
+                                  <p:childTnLst>
+                                    <p:set>
+                                      <p:cBhvr>
+                                        <p:cTn id="9" dur="1" fill="hold">
+                                          <p:stCondLst>
+                                            <p:cond delay="0"/>
+                                          </p:stCondLst>
+                                        </p:cTn>
+                                        <p:tgtEl>
+                                          <p:spTgt spid="3">
+                                            <p:txEl>
+                                              <p:pRg st="3" end="3"/>
+                                            </p:txEl>
+                                          </p:spTgt>
+                                        </p:tgtEl>
+                                        <p:attrNameLst>
+                                          <p:attrName>style.visibility</p:attrName>
+                                        </p:attrNameLst>
+                                      </p:cBhvr>
+                                      <p:to>
+                                        <p:strVal val="visible"/>
+                                      </p:to>
+                                    </p:set>
+                                    <p:animEffect transition="in" filter="dissolve">
+                                      <p:cBhvr>
+                                        <p:cTn id="10" dur="500"/>
+                                        <p:tgtEl>
+                                          <p:spTgt spid="3">
+                                            <p:txEl>
+                                              <p:pRg st="3" end="3"/>
+                                            </p:txEl>
+                                          </p:spTgt>
+                                        </p:tgtEl>
+                                      </p:cBhvr>
+                                    </p:animEffect>
+                                  </p:childTnLst>
+                                </p:cTn>
+                              </p:par>
                             </p:childTnLst>
                           </p:cTn>
                         </p:par>
@@ -6750,7 +8248,7 @@
 </p:sld>
 </file>
 
-<file path=ppt/slides/slide15.xml><?xml version="1.0" encoding="utf-8"?>
+<file path=ppt/slides/slide16.xml><?xml version="1.0" encoding="utf-8"?>
 <p:sld xmlns:a="http://schemas.openxmlformats.org/drawingml/2006/main" xmlns:r="http://schemas.openxmlformats.org/officeDocument/2006/relationships" xmlns:p="http://schemas.openxmlformats.org/presentationml/2006/main">
   <p:cSld>
     <p:spTree>
@@ -6769,9 +8267,9 @@
       </p:grpSpPr>
       <p:sp>
         <p:nvSpPr>
-          <p:cNvPr id="2" name="Title 1"/>
-          <p:cNvSpPr>
-            <a:spLocks noGrp="1"/>
+          <p:cNvPr id="17410" name="Rectangle 2"/>
+          <p:cNvSpPr>
+            <a:spLocks noGrp="1" noChangeArrowheads="1"/>
           </p:cNvSpPr>
           <p:nvPr>
             <p:ph type="title"/>
@@ -6782,6 +8280,789 @@
           <a:bodyPr/>
           <a:lstStyle/>
           <a:p>
+            <a:pPr eaLnBrk="1" hangingPunct="1"/>
+            <a:r>
+              <a:rPr lang="en-US" sz="4000" dirty="0" smtClean="0">
+                <a:solidFill>
+                  <a:srgbClr val="0000FF"/>
+                </a:solidFill>
+              </a:rPr>
+              <a:t>k</a:t>
+            </a:r>
+            <a:r>
+              <a:rPr lang="en-US" sz="4000" dirty="0" smtClean="0">
+                <a:solidFill>
+                  <a:schemeClr val="tx1"/>
+                </a:solidFill>
+              </a:rPr>
+              <a:t>-vertex</a:t>
+            </a:r>
+            <a:r>
+              <a:rPr lang="en-US" sz="4000" dirty="0" smtClean="0">
+                <a:solidFill>
+                  <a:srgbClr val="0033CC"/>
+                </a:solidFill>
+              </a:rPr>
+              <a:t> </a:t>
+            </a:r>
+            <a:r>
+              <a:rPr lang="en-US" sz="4000" dirty="0" smtClean="0"/>
+              <a:t>Connectedness</a:t>
+            </a:r>
+          </a:p>
+        </p:txBody>
+      </p:sp>
+      <p:sp>
+        <p:nvSpPr>
+          <p:cNvPr id="3" name="TextBox 2"/>
+          <p:cNvSpPr txBox="1"/>
+          <p:nvPr/>
+        </p:nvSpPr>
+        <p:spPr>
+          <a:xfrm>
+            <a:off x="254001" y="719669"/>
+            <a:ext cx="8551332" cy="5724644"/>
+          </a:xfrm>
+          <a:prstGeom prst="rect">
+            <a:avLst/>
+          </a:prstGeom>
+          <a:noFill/>
+        </p:spPr>
+        <p:txBody>
+          <a:bodyPr wrap="square" rtlCol="0">
+            <a:spAutoFit/>
+          </a:bodyPr>
+          <a:lstStyle/>
+          <a:p>
+            <a:r>
+              <a:rPr lang="en-US" sz="6000" dirty="0" smtClean="0">
+                <a:latin typeface="+mj-lt"/>
+              </a:rPr>
+              <a:t>The </a:t>
+            </a:r>
+            <a:r>
+              <a:rPr lang="en-US" sz="6600" dirty="0" smtClean="0">
+                <a:solidFill>
+                  <a:srgbClr val="0000FF"/>
+                </a:solidFill>
+                <a:latin typeface="+mj-lt"/>
+              </a:rPr>
+              <a:t>n</a:t>
+            </a:r>
+            <a:r>
+              <a:rPr lang="en-US" sz="6600" dirty="0" smtClean="0">
+                <a:solidFill>
+                  <a:srgbClr val="930093"/>
+                </a:solidFill>
+                <a:latin typeface="+mj-lt"/>
+              </a:rPr>
+              <a:t>-dimensional</a:t>
+            </a:r>
+            <a:endParaRPr lang="en-US" sz="6600" dirty="0">
+              <a:latin typeface="+mj-lt"/>
+            </a:endParaRPr>
+          </a:p>
+          <a:p>
+            <a:pPr>
+              <a:spcAft>
+                <a:spcPts val="1800"/>
+              </a:spcAft>
+            </a:pPr>
+            <a:r>
+              <a:rPr lang="en-US" sz="6600" dirty="0" smtClean="0">
+                <a:solidFill>
+                  <a:srgbClr val="930093"/>
+                </a:solidFill>
+                <a:latin typeface="+mj-lt"/>
+              </a:rPr>
+              <a:t>hypercube </a:t>
+            </a:r>
+            <a:r>
+              <a:rPr lang="en-US" sz="6600" dirty="0" err="1" smtClean="0">
+                <a:solidFill>
+                  <a:srgbClr val="0000FF"/>
+                </a:solidFill>
+                <a:latin typeface="Comic Sans MS"/>
+                <a:cs typeface="Comic Sans MS"/>
+              </a:rPr>
+              <a:t>H</a:t>
+            </a:r>
+            <a:r>
+              <a:rPr lang="en-US" sz="6600" baseline="-25000" dirty="0" err="1" smtClean="0">
+                <a:solidFill>
+                  <a:srgbClr val="0000FF"/>
+                </a:solidFill>
+                <a:latin typeface="Comic Sans MS"/>
+                <a:cs typeface="Comic Sans MS"/>
+              </a:rPr>
+              <a:t>n</a:t>
+            </a:r>
+            <a:endParaRPr lang="en-US" sz="6600" baseline="-25000" dirty="0" smtClean="0">
+              <a:solidFill>
+                <a:srgbClr val="0000FF"/>
+              </a:solidFill>
+              <a:latin typeface="Comic Sans MS"/>
+              <a:cs typeface="Comic Sans MS"/>
+            </a:endParaRPr>
+          </a:p>
+          <a:p>
+            <a:pPr>
+              <a:spcAft>
+                <a:spcPts val="1800"/>
+              </a:spcAft>
+            </a:pPr>
+            <a:r>
+              <a:rPr lang="en-US" sz="6600" dirty="0" smtClean="0">
+                <a:solidFill>
+                  <a:srgbClr val="0000FF"/>
+                </a:solidFill>
+                <a:latin typeface="Comic Sans MS"/>
+                <a:cs typeface="Comic Sans MS"/>
+              </a:rPr>
+              <a:t>V(</a:t>
+            </a:r>
+            <a:r>
+              <a:rPr lang="en-US" sz="6600" dirty="0" err="1" smtClean="0">
+                <a:solidFill>
+                  <a:srgbClr val="0000FF"/>
+                </a:solidFill>
+                <a:latin typeface="Comic Sans MS"/>
+                <a:cs typeface="Comic Sans MS"/>
+              </a:rPr>
+              <a:t>H</a:t>
+            </a:r>
+            <a:r>
+              <a:rPr lang="en-US" sz="6600" baseline="-25000" dirty="0" err="1" smtClean="0">
+                <a:solidFill>
+                  <a:srgbClr val="0000FF"/>
+                </a:solidFill>
+                <a:latin typeface="Comic Sans MS"/>
+                <a:cs typeface="Comic Sans MS"/>
+              </a:rPr>
+              <a:t>n</a:t>
+            </a:r>
+            <a:r>
+              <a:rPr lang="en-US" sz="6600" dirty="0" smtClean="0">
+                <a:solidFill>
+                  <a:srgbClr val="0000FF"/>
+                </a:solidFill>
+                <a:latin typeface="Comic Sans MS"/>
+                <a:cs typeface="Comic Sans MS"/>
+              </a:rPr>
+              <a:t>) ::= {0,1}</a:t>
+            </a:r>
+            <a:r>
+              <a:rPr lang="en-US" sz="6600" baseline="30000" dirty="0" smtClean="0">
+                <a:solidFill>
+                  <a:srgbClr val="0000FF"/>
+                </a:solidFill>
+                <a:latin typeface="Comic Sans MS"/>
+                <a:cs typeface="Comic Sans MS"/>
+              </a:rPr>
+              <a:t>n</a:t>
+            </a:r>
+          </a:p>
+          <a:p>
+            <a:pPr>
+              <a:spcAft>
+                <a:spcPts val="1800"/>
+              </a:spcAft>
+            </a:pPr>
+            <a:r>
+              <a:rPr lang="en-US" sz="6600" dirty="0" smtClean="0">
+                <a:solidFill>
+                  <a:srgbClr val="000000"/>
+                </a:solidFill>
+                <a:latin typeface="Comic Sans MS"/>
+                <a:cs typeface="Comic Sans MS"/>
+              </a:rPr>
+              <a:t>         an </a:t>
+            </a:r>
+            <a:r>
+              <a:rPr lang="en-US" sz="6600" dirty="0" smtClean="0">
+                <a:solidFill>
+                  <a:srgbClr val="000000"/>
+                </a:solidFill>
+                <a:latin typeface="Comic Sans MS"/>
+                <a:cs typeface="Comic Sans MS"/>
+              </a:rPr>
+              <a:t>edge</a:t>
+            </a:r>
+            <a:r>
+              <a:rPr lang="en-US" sz="7200" dirty="0">
+                <a:solidFill>
+                  <a:srgbClr val="000000"/>
+                </a:solidFill>
+                <a:latin typeface="Comic Sans MS"/>
+                <a:cs typeface="Comic Sans MS"/>
+              </a:rPr>
+              <a:t> </a:t>
+            </a:r>
+            <a:r>
+              <a:rPr lang="en-US" sz="5400" dirty="0" smtClean="0">
+                <a:latin typeface="Comic Sans MS"/>
+                <a:cs typeface="Comic Sans MS"/>
+              </a:rPr>
+              <a:t>IFF</a:t>
+            </a:r>
+            <a:r>
+              <a:rPr lang="en-US" sz="6600" dirty="0" smtClean="0">
+                <a:latin typeface="Comic Sans MS"/>
+                <a:cs typeface="Comic Sans MS"/>
+              </a:rPr>
+              <a:t> </a:t>
+            </a:r>
+            <a:r>
+              <a:rPr lang="en-US" sz="6600" dirty="0" err="1" smtClean="0">
+                <a:solidFill>
+                  <a:srgbClr val="0000FF"/>
+                </a:solidFill>
+                <a:latin typeface="Comic Sans MS"/>
+                <a:cs typeface="Comic Sans MS"/>
+              </a:rPr>
+              <a:t>u</a:t>
+            </a:r>
+            <a:r>
+              <a:rPr lang="en-US" sz="6600" dirty="0" err="1" smtClean="0">
+                <a:latin typeface="Comic Sans MS"/>
+                <a:cs typeface="Comic Sans MS"/>
+              </a:rPr>
+              <a:t>,</a:t>
+            </a:r>
+            <a:r>
+              <a:rPr lang="en-US" sz="6600" dirty="0" err="1" smtClean="0">
+                <a:solidFill>
+                  <a:srgbClr val="0000FF"/>
+                </a:solidFill>
+                <a:latin typeface="Comic Sans MS"/>
+                <a:cs typeface="Comic Sans MS"/>
+              </a:rPr>
+              <a:t>v</a:t>
+            </a:r>
+            <a:r>
+              <a:rPr lang="en-US" sz="6600" dirty="0" smtClean="0">
+                <a:latin typeface="Comic Sans MS"/>
+                <a:cs typeface="Comic Sans MS"/>
+              </a:rPr>
+              <a:t>    		 differ in </a:t>
+            </a:r>
+            <a:r>
+              <a:rPr lang="en-US" sz="6600" dirty="0" smtClean="0">
+                <a:solidFill>
+                  <a:srgbClr val="0000FF"/>
+                </a:solidFill>
+                <a:latin typeface="Comic Sans MS"/>
+                <a:cs typeface="Comic Sans MS"/>
+              </a:rPr>
+              <a:t>1</a:t>
+            </a:r>
+            <a:r>
+              <a:rPr lang="en-US" sz="6600" dirty="0" smtClean="0">
+                <a:latin typeface="Comic Sans MS"/>
+                <a:cs typeface="Comic Sans MS"/>
+              </a:rPr>
+              <a:t> place</a:t>
+            </a:r>
+            <a:endParaRPr lang="en-US" sz="7200" dirty="0" smtClean="0">
+              <a:latin typeface="+mj-lt"/>
+            </a:endParaRPr>
+          </a:p>
+        </p:txBody>
+      </p:sp>
+      <p:graphicFrame>
+        <p:nvGraphicFramePr>
+          <p:cNvPr id="2" name="Object 1"/>
+          <p:cNvGraphicFramePr>
+            <a:graphicFrameLocks noChangeAspect="1"/>
+          </p:cNvGraphicFramePr>
+          <p:nvPr>
+            <p:extLst>
+              <p:ext uri="{D42A27DB-BD31-4B8C-83A1-F6EECF244321}">
+                <p14:modId xmlns:p14="http://schemas.microsoft.com/office/powerpoint/2010/main" val="1304198932"/>
+              </p:ext>
+            </p:extLst>
+          </p:nvPr>
+        </p:nvGraphicFramePr>
+        <p:xfrm>
+          <a:off x="136170" y="4138082"/>
+          <a:ext cx="2361494" cy="1615759"/>
+        </p:xfrm>
+        <a:graphic>
+          <a:graphicData uri="http://schemas.openxmlformats.org/presentationml/2006/ole">
+            <mc:AlternateContent xmlns:mc="http://schemas.openxmlformats.org/markup-compatibility/2006">
+              <mc:Choice xmlns:v="urn:schemas-microsoft-com:vml" Requires="v">
+                <p:oleObj spid="_x0000_s1028" name="Equation" r:id="rId4" imgW="482600" imgH="330200" progId="Equation.DSMT4">
+                  <p:embed/>
+                </p:oleObj>
+              </mc:Choice>
+              <mc:Fallback>
+                <p:oleObj name="Equation" r:id="rId4" imgW="482600" imgH="330200" progId="Equation.DSMT4">
+                  <p:embed/>
+                  <p:pic>
+                    <p:nvPicPr>
+                      <p:cNvPr id="0" name=""/>
+                      <p:cNvPicPr/>
+                      <p:nvPr/>
+                    </p:nvPicPr>
+                    <p:blipFill>
+                      <a:blip r:embed="rId5"/>
+                      <a:stretch>
+                        <a:fillRect/>
+                      </a:stretch>
+                    </p:blipFill>
+                    <p:spPr>
+                      <a:xfrm>
+                        <a:off x="136170" y="4138082"/>
+                        <a:ext cx="2361494" cy="1615759"/>
+                      </a:xfrm>
+                      <a:prstGeom prst="rect">
+                        <a:avLst/>
+                      </a:prstGeom>
+                    </p:spPr>
+                  </p:pic>
+                </p:oleObj>
+              </mc:Fallback>
+            </mc:AlternateContent>
+          </a:graphicData>
+        </a:graphic>
+      </p:graphicFrame>
+    </p:spTree>
+    <p:extLst>
+      <p:ext uri="{BB962C8B-B14F-4D97-AF65-F5344CB8AC3E}">
+        <p14:creationId xmlns:p14="http://schemas.microsoft.com/office/powerpoint/2010/main" val="3059341107"/>
+      </p:ext>
+    </p:extLst>
+  </p:cSld>
+  <p:clrMapOvr>
+    <a:masterClrMapping/>
+  </p:clrMapOvr>
+  <mc:AlternateContent xmlns:mc="http://schemas.openxmlformats.org/markup-compatibility/2006" xmlns:p14="http://schemas.microsoft.com/office/powerpoint/2010/main">
+    <mc:Choice Requires="p14">
+      <p:transition spd="slow" p14:dur="1200">
+        <p:fade/>
+      </p:transition>
+    </mc:Choice>
+    <mc:Fallback xmlns="">
+      <p:transition xmlns:p14="http://schemas.microsoft.com/office/powerpoint/2010/main" spd="slow">
+        <p:fade/>
+      </p:transition>
+    </mc:Fallback>
+  </mc:AlternateContent>
+  <p:timing>
+    <p:tnLst>
+      <p:par>
+        <p:cTn xmlns:p14="http://schemas.microsoft.com/office/powerpoint/2010/main" id="1" dur="indefinite" restart="never" nodeType="tmRoot">
+          <p:childTnLst>
+            <p:seq concurrent="1" nextAc="seek">
+              <p:cTn id="2" dur="indefinite" nodeType="mainSeq">
+                <p:childTnLst>
+                  <p:par>
+                    <p:cTn id="3" fill="hold">
+                      <p:stCondLst>
+                        <p:cond delay="indefinite"/>
+                      </p:stCondLst>
+                      <p:childTnLst>
+                        <p:par>
+                          <p:cTn id="4" fill="hold">
+                            <p:stCondLst>
+                              <p:cond delay="0"/>
+                            </p:stCondLst>
+                            <p:childTnLst>
+                              <p:par>
+                                <p:cTn id="5" presetID="9" presetClass="entr" presetSubtype="0" fill="hold" grpId="0" nodeType="clickEffect">
+                                  <p:stCondLst>
+                                    <p:cond delay="0"/>
+                                  </p:stCondLst>
+                                  <p:childTnLst>
+                                    <p:set>
+                                      <p:cBhvr>
+                                        <p:cTn id="6" dur="1" fill="hold">
+                                          <p:stCondLst>
+                                            <p:cond delay="0"/>
+                                          </p:stCondLst>
+                                        </p:cTn>
+                                        <p:tgtEl>
+                                          <p:spTgt spid="3">
+                                            <p:txEl>
+                                              <p:pRg st="2" end="2"/>
+                                            </p:txEl>
+                                          </p:spTgt>
+                                        </p:tgtEl>
+                                        <p:attrNameLst>
+                                          <p:attrName>style.visibility</p:attrName>
+                                        </p:attrNameLst>
+                                      </p:cBhvr>
+                                      <p:to>
+                                        <p:strVal val="visible"/>
+                                      </p:to>
+                                    </p:set>
+                                    <p:animEffect transition="in" filter="dissolve">
+                                      <p:cBhvr>
+                                        <p:cTn id="7" dur="500"/>
+                                        <p:tgtEl>
+                                          <p:spTgt spid="3">
+                                            <p:txEl>
+                                              <p:pRg st="2" end="2"/>
+                                            </p:txEl>
+                                          </p:spTgt>
+                                        </p:tgtEl>
+                                      </p:cBhvr>
+                                    </p:animEffect>
+                                  </p:childTnLst>
+                                </p:cTn>
+                              </p:par>
+                            </p:childTnLst>
+                          </p:cTn>
+                        </p:par>
+                      </p:childTnLst>
+                    </p:cTn>
+                  </p:par>
+                  <p:par>
+                    <p:cTn id="8" fill="hold">
+                      <p:stCondLst>
+                        <p:cond delay="indefinite"/>
+                      </p:stCondLst>
+                      <p:childTnLst>
+                        <p:par>
+                          <p:cTn id="9" fill="hold">
+                            <p:stCondLst>
+                              <p:cond delay="0"/>
+                            </p:stCondLst>
+                            <p:childTnLst>
+                              <p:par>
+                                <p:cTn id="10" presetID="22" presetClass="entr" presetSubtype="8" fill="hold" nodeType="clickEffect">
+                                  <p:stCondLst>
+                                    <p:cond delay="0"/>
+                                  </p:stCondLst>
+                                  <p:childTnLst>
+                                    <p:set>
+                                      <p:cBhvr>
+                                        <p:cTn id="11" dur="1" fill="hold">
+                                          <p:stCondLst>
+                                            <p:cond delay="0"/>
+                                          </p:stCondLst>
+                                        </p:cTn>
+                                        <p:tgtEl>
+                                          <p:spTgt spid="2"/>
+                                        </p:tgtEl>
+                                        <p:attrNameLst>
+                                          <p:attrName>style.visibility</p:attrName>
+                                        </p:attrNameLst>
+                                      </p:cBhvr>
+                                      <p:to>
+                                        <p:strVal val="visible"/>
+                                      </p:to>
+                                    </p:set>
+                                    <p:animEffect transition="in" filter="wipe(left)">
+                                      <p:cBhvr>
+                                        <p:cTn id="12" dur="500"/>
+                                        <p:tgtEl>
+                                          <p:spTgt spid="2"/>
+                                        </p:tgtEl>
+                                      </p:cBhvr>
+                                    </p:animEffect>
+                                  </p:childTnLst>
+                                </p:cTn>
+                              </p:par>
+                            </p:childTnLst>
+                          </p:cTn>
+                        </p:par>
+                        <p:par>
+                          <p:cTn id="13" fill="hold">
+                            <p:stCondLst>
+                              <p:cond delay="500"/>
+                            </p:stCondLst>
+                            <p:childTnLst>
+                              <p:par>
+                                <p:cTn id="14" presetID="9" presetClass="entr" presetSubtype="0" fill="hold" grpId="0" nodeType="afterEffect">
+                                  <p:stCondLst>
+                                    <p:cond delay="0"/>
+                                  </p:stCondLst>
+                                  <p:childTnLst>
+                                    <p:set>
+                                      <p:cBhvr>
+                                        <p:cTn id="15" dur="1" fill="hold">
+                                          <p:stCondLst>
+                                            <p:cond delay="0"/>
+                                          </p:stCondLst>
+                                        </p:cTn>
+                                        <p:tgtEl>
+                                          <p:spTgt spid="3">
+                                            <p:txEl>
+                                              <p:pRg st="3" end="3"/>
+                                            </p:txEl>
+                                          </p:spTgt>
+                                        </p:tgtEl>
+                                        <p:attrNameLst>
+                                          <p:attrName>style.visibility</p:attrName>
+                                        </p:attrNameLst>
+                                      </p:cBhvr>
+                                      <p:to>
+                                        <p:strVal val="visible"/>
+                                      </p:to>
+                                    </p:set>
+                                    <p:animEffect transition="in" filter="dissolve">
+                                      <p:cBhvr>
+                                        <p:cTn id="16" dur="500"/>
+                                        <p:tgtEl>
+                                          <p:spTgt spid="3">
+                                            <p:txEl>
+                                              <p:pRg st="3" end="3"/>
+                                            </p:txEl>
+                                          </p:spTgt>
+                                        </p:tgtEl>
+                                      </p:cBhvr>
+                                    </p:animEffect>
+                                  </p:childTnLst>
+                                </p:cTn>
+                              </p:par>
+                            </p:childTnLst>
+                          </p:cTn>
+                        </p:par>
+                      </p:childTnLst>
+                    </p:cTn>
+                  </p:par>
+                </p:childTnLst>
+              </p:cTn>
+              <p:prevCondLst>
+                <p:cond evt="onPrev" delay="0">
+                  <p:tgtEl>
+                    <p:sldTgt/>
+                  </p:tgtEl>
+                </p:cond>
+              </p:prevCondLst>
+              <p:nextCondLst>
+                <p:cond evt="onNext" delay="0">
+                  <p:tgtEl>
+                    <p:sldTgt/>
+                  </p:tgtEl>
+                </p:cond>
+              </p:nextCondLst>
+            </p:seq>
+          </p:childTnLst>
+        </p:cTn>
+      </p:par>
+    </p:tnLst>
+    <p:bldLst>
+      <p:bldP spid="3" grpId="0" uiExpand="1" build="p"/>
+    </p:bldLst>
+  </p:timing>
+</p:sld>
+</file>
+
+<file path=ppt/slides/slide17.xml><?xml version="1.0" encoding="utf-8"?>
+<p:sld xmlns:a="http://schemas.openxmlformats.org/drawingml/2006/main" xmlns:r="http://schemas.openxmlformats.org/officeDocument/2006/relationships" xmlns:p="http://schemas.openxmlformats.org/presentationml/2006/main">
+  <p:cSld>
+    <p:spTree>
+      <p:nvGrpSpPr>
+        <p:cNvPr id="1" name=""/>
+        <p:cNvGrpSpPr/>
+        <p:nvPr/>
+      </p:nvGrpSpPr>
+      <p:grpSpPr>
+        <a:xfrm>
+          <a:off x="0" y="0"/>
+          <a:ext cx="0" cy="0"/>
+          <a:chOff x="0" y="0"/>
+          <a:chExt cx="0" cy="0"/>
+        </a:xfrm>
+      </p:grpSpPr>
+      <p:sp>
+        <p:nvSpPr>
+          <p:cNvPr id="17410" name="Rectangle 2"/>
+          <p:cNvSpPr>
+            <a:spLocks noGrp="1" noChangeArrowheads="1"/>
+          </p:cNvSpPr>
+          <p:nvPr>
+            <p:ph type="title"/>
+          </p:nvPr>
+        </p:nvSpPr>
+        <p:spPr/>
+        <p:txBody>
+          <a:bodyPr/>
+          <a:lstStyle/>
+          <a:p>
+            <a:pPr eaLnBrk="1" hangingPunct="1"/>
+            <a:r>
+              <a:rPr lang="en-US" sz="4000" dirty="0" smtClean="0">
+                <a:solidFill>
+                  <a:srgbClr val="0000FF"/>
+                </a:solidFill>
+              </a:rPr>
+              <a:t>k</a:t>
+            </a:r>
+            <a:r>
+              <a:rPr lang="en-US" sz="4000" dirty="0" smtClean="0">
+                <a:solidFill>
+                  <a:schemeClr val="tx1"/>
+                </a:solidFill>
+              </a:rPr>
+              <a:t>-vertex</a:t>
+            </a:r>
+            <a:r>
+              <a:rPr lang="en-US" sz="4000" dirty="0" smtClean="0">
+                <a:solidFill>
+                  <a:srgbClr val="0033CC"/>
+                </a:solidFill>
+              </a:rPr>
+              <a:t> </a:t>
+            </a:r>
+            <a:r>
+              <a:rPr lang="en-US" sz="4000" dirty="0" smtClean="0"/>
+              <a:t>Connectedness</a:t>
+            </a:r>
+          </a:p>
+        </p:txBody>
+      </p:sp>
+      <p:sp>
+        <p:nvSpPr>
+          <p:cNvPr id="3" name="TextBox 2"/>
+          <p:cNvSpPr txBox="1"/>
+          <p:nvPr/>
+        </p:nvSpPr>
+        <p:spPr>
+          <a:xfrm>
+            <a:off x="691442" y="1721549"/>
+            <a:ext cx="7577666" cy="3785652"/>
+          </a:xfrm>
+          <a:prstGeom prst="rect">
+            <a:avLst/>
+          </a:prstGeom>
+          <a:noFill/>
+        </p:spPr>
+        <p:txBody>
+          <a:bodyPr wrap="square" rtlCol="0">
+            <a:spAutoFit/>
+          </a:bodyPr>
+          <a:lstStyle/>
+          <a:p>
+            <a:r>
+              <a:rPr lang="en-US" sz="8800" dirty="0" err="1" smtClean="0">
+                <a:solidFill>
+                  <a:srgbClr val="0000FF"/>
+                </a:solidFill>
+                <a:latin typeface="Comic Sans MS"/>
+                <a:cs typeface="Comic Sans MS"/>
+              </a:rPr>
+              <a:t>H</a:t>
+            </a:r>
+            <a:r>
+              <a:rPr lang="en-US" sz="8800" baseline="-25000" dirty="0" err="1" smtClean="0">
+                <a:solidFill>
+                  <a:srgbClr val="0000FF"/>
+                </a:solidFill>
+                <a:latin typeface="Comic Sans MS"/>
+                <a:cs typeface="Comic Sans MS"/>
+              </a:rPr>
+              <a:t>n</a:t>
+            </a:r>
+            <a:r>
+              <a:rPr lang="en-US" sz="8800" baseline="-25000" dirty="0" smtClean="0">
+                <a:solidFill>
+                  <a:srgbClr val="0000FF"/>
+                </a:solidFill>
+                <a:latin typeface="Comic Sans MS"/>
+                <a:cs typeface="Comic Sans MS"/>
+              </a:rPr>
+              <a:t>  </a:t>
+            </a:r>
+            <a:r>
+              <a:rPr lang="en-US" sz="8000" dirty="0" smtClean="0">
+                <a:latin typeface="+mj-lt"/>
+              </a:rPr>
+              <a:t>is </a:t>
+            </a:r>
+            <a:r>
+              <a:rPr lang="en-US" sz="8000" dirty="0" smtClean="0">
+                <a:solidFill>
+                  <a:srgbClr val="0000FF"/>
+                </a:solidFill>
+                <a:latin typeface="+mj-lt"/>
+              </a:rPr>
+              <a:t>n</a:t>
+            </a:r>
+            <a:r>
+              <a:rPr lang="en-US" sz="8000" dirty="0" smtClean="0">
+                <a:solidFill>
+                  <a:srgbClr val="000000"/>
+                </a:solidFill>
+                <a:latin typeface="+mj-lt"/>
+              </a:rPr>
+              <a:t>-vertex </a:t>
+            </a:r>
+            <a:r>
+              <a:rPr lang="en-US" sz="8000" dirty="0" smtClean="0">
+                <a:latin typeface="+mj-lt"/>
+              </a:rPr>
+              <a:t>connected.</a:t>
+            </a:r>
+          </a:p>
+          <a:p>
+            <a:pPr algn="ctr"/>
+            <a:r>
+              <a:rPr lang="en-US" sz="7200" dirty="0" smtClean="0">
+                <a:latin typeface="+mj-lt"/>
+              </a:rPr>
+              <a:t>(class problem)</a:t>
+            </a:r>
+          </a:p>
+        </p:txBody>
+      </p:sp>
+    </p:spTree>
+    <p:extLst>
+      <p:ext uri="{BB962C8B-B14F-4D97-AF65-F5344CB8AC3E}">
+        <p14:creationId xmlns:p14="http://schemas.microsoft.com/office/powerpoint/2010/main" val="1389329225"/>
+      </p:ext>
+    </p:extLst>
+  </p:cSld>
+  <p:clrMapOvr>
+    <a:masterClrMapping/>
+  </p:clrMapOvr>
+  <p:transition xmlns:p14="http://schemas.microsoft.com/office/powerpoint/2010/main" spd="slow">
+    <p:fade/>
+  </p:transition>
+  <p:timing>
+    <p:tnLst>
+      <p:par>
+        <p:cTn xmlns:p14="http://schemas.microsoft.com/office/powerpoint/2010/main" id="1" dur="indefinite" restart="never" nodeType="tmRoot"/>
+      </p:par>
+    </p:tnLst>
+  </p:timing>
+</p:sld>
+</file>
+
+<file path=ppt/slides/slide18.xml><?xml version="1.0" encoding="utf-8"?>
+<p:sld xmlns:a="http://schemas.openxmlformats.org/drawingml/2006/main" xmlns:r="http://schemas.openxmlformats.org/officeDocument/2006/relationships" xmlns:p="http://schemas.openxmlformats.org/presentationml/2006/main">
+  <p:cSld>
+    <p:spTree>
+      <p:nvGrpSpPr>
+        <p:cNvPr id="1" name=""/>
+        <p:cNvGrpSpPr/>
+        <p:nvPr/>
+      </p:nvGrpSpPr>
+      <p:grpSpPr>
+        <a:xfrm>
+          <a:off x="0" y="0"/>
+          <a:ext cx="0" cy="0"/>
+          <a:chOff x="0" y="0"/>
+          <a:chExt cx="0" cy="0"/>
+        </a:xfrm>
+      </p:grpSpPr>
+      <p:sp>
+        <p:nvSpPr>
+          <p:cNvPr id="2" name="Title 1"/>
+          <p:cNvSpPr>
+            <a:spLocks noGrp="1"/>
+          </p:cNvSpPr>
+          <p:nvPr>
+            <p:ph type="title"/>
+          </p:nvPr>
+        </p:nvSpPr>
+        <p:spPr/>
+        <p:txBody>
+          <a:bodyPr/>
+          <a:lstStyle/>
+          <a:p>
             <a:r>
               <a:rPr lang="en-US" sz="4400" dirty="0" err="1" smtClean="0"/>
               <a:t>Menger’s</a:t>
@@ -6806,7 +9087,7 @@
         </p:nvSpPr>
         <p:spPr>
           <a:xfrm>
-            <a:off x="395112" y="1425223"/>
+            <a:off x="395112" y="1693332"/>
             <a:ext cx="8382000" cy="3584221"/>
           </a:xfrm>
         </p:spPr>
@@ -6840,11 +9121,6 @@
               </a:rPr>
               <a:t>k</a:t>
             </a:r>
-            <a:endParaRPr lang="en-US" sz="6000" dirty="0" smtClean="0">
-              <a:solidFill>
-                <a:srgbClr val="0000FF"/>
-              </a:solidFill>
-            </a:endParaRPr>
           </a:p>
           <a:p>
             <a:r>
@@ -6853,11 +9129,11 @@
                   <a:srgbClr val="930093"/>
                 </a:solidFill>
               </a:rPr>
-              <a:t>edge-disjoint</a:t>
+              <a:t>non-overlapping </a:t>
             </a:r>
             <a:r>
               <a:rPr lang="en-US" sz="6000" dirty="0" smtClean="0"/>
-              <a:t> paths</a:t>
+              <a:t>paths</a:t>
             </a:r>
             <a:endParaRPr lang="en-US" sz="6000" dirty="0"/>
           </a:p>
@@ -6890,7 +9166,7 @@
               <a:pPr>
                 <a:defRPr/>
               </a:pPr>
-              <a:t>15</a:t>
+              <a:t>18</a:t>
             </a:fld>
             <a:endParaRPr lang="en-US" dirty="0"/>
           </a:p>
@@ -6919,7 +9195,7 @@
 </p:sld>
 </file>
 
-<file path=ppt/slides/slide16.xml><?xml version="1.0" encoding="utf-8"?>
+<file path=ppt/slides/slide19.xml><?xml version="1.0" encoding="utf-8"?>
 <p:sld xmlns:a="http://schemas.openxmlformats.org/drawingml/2006/main" xmlns:r="http://schemas.openxmlformats.org/officeDocument/2006/relationships" xmlns:p="http://schemas.openxmlformats.org/presentationml/2006/main" show="0">
   <p:cSld>
     <p:spTree>
@@ -7314,7 +9590,7 @@
               <a:pPr>
                 <a:defRPr/>
               </a:pPr>
-              <a:t>16</a:t>
+              <a:t>19</a:t>
             </a:fld>
             <a:endParaRPr lang="en-US" dirty="0"/>
           </a:p>

</xml_diff>